<commit_message>
Modificado el documento de registro de cambios y añadido contenido a la presentación de evolución de estilo visual
</commit_message>
<xml_diff>
--- a/Evolución visual.pptx
+++ b/Evolución visual.pptx
@@ -5,12 +5,14 @@
     <p:sldMasterId id="2147483648" r:id="rId1"/>
   </p:sldMasterIdLst>
   <p:notesMasterIdLst>
-    <p:notesMasterId r:id="rId7"/>
+    <p:notesMasterId r:id="rId9"/>
   </p:notesMasterIdLst>
   <p:sldIdLst>
     <p:sldId id="256" r:id="rId4"/>
     <p:sldId id="257" r:id="rId5"/>
     <p:sldId id="258" r:id="rId6"/>
+    <p:sldId id="259" r:id="rId7"/>
+    <p:sldId id="260" r:id="rId8"/>
   </p:sldIdLst>
   <p:sldSz cx="12192000" cy="6858000"/>
   <p:notesSz cx="6858000" cy="9144000"/>
@@ -740,6 +742,185 @@
 </p:notes>
 </file>
 
+<file path=ppt/notesSlides/notesSlide4.xml><?xml version="1.0" encoding="utf-8"?>
+<p:notes xmlns:a="http://schemas.openxmlformats.org/drawingml/2006/main" xmlns:r="http://schemas.openxmlformats.org/officeDocument/2006/relationships" xmlns:p="http://schemas.openxmlformats.org/presentationml/2006/main" xmlns:m="http://schemas.openxmlformats.org/officeDocument/2006/math" xmlns:w="http://schemas.openxmlformats.org/wordprocessingml/2006/main">
+  <p:cSld name="">
+    <p:spTree>
+      <p:nvGrpSpPr>
+        <p:cNvPr id="1" name=""/>
+        <p:cNvGrpSpPr/>
+        <p:nvPr/>
+      </p:nvGrpSpPr>
+      <p:grpSpPr bwMode="auto">
+        <a:xfrm>
+          <a:off x="0" y="0"/>
+          <a:ext cx="0" cy="0"/>
+          <a:chOff x="0" y="0"/>
+          <a:chExt cx="0" cy="0"/>
+        </a:xfrm>
+      </p:grpSpPr>
+      <p:sp>
+        <p:nvSpPr>
+          <p:cNvPr id="2" name="Slide Image Placeholder 1"/>
+          <p:cNvSpPr>
+            <a:spLocks noChangeAspect="1" noGrp="1" noRot="1"/>
+          </p:cNvSpPr>
+          <p:nvPr>
+            <p:ph type="sldImg"/>
+          </p:nvPr>
+        </p:nvSpPr>
+        <p:spPr bwMode="auto"/>
+      </p:sp>
+      <p:sp>
+        <p:nvSpPr>
+          <p:cNvPr id="3" name="Notes Placeholder 2"/>
+          <p:cNvSpPr>
+            <a:spLocks noGrp="1"/>
+          </p:cNvSpPr>
+          <p:nvPr>
+            <p:ph type="body" idx="1"/>
+          </p:nvPr>
+        </p:nvSpPr>
+        <p:spPr bwMode="auto"/>
+        <p:txBody>
+          <a:bodyPr/>
+          <a:lstStyle/>
+          <a:p>
+            <a:pPr>
+              <a:defRPr/>
+            </a:pPr>
+            <a:r>
+              <a:rPr/>
+              <a:t>Soy consciente de que a comparación de las anteriores diapositivas esto es horrible, pero lo que se ha enseñado antes era un prototipo visual y no funcional. Primero me quiero asegurar de que funciona y posteriormente añadir estilo.</a:t>
+            </a:r>
+            <a:endParaRPr/>
+          </a:p>
+        </p:txBody>
+      </p:sp>
+      <p:sp>
+        <p:nvSpPr>
+          <p:cNvPr id="4" name="Slide Number Placeholder 3"/>
+          <p:cNvSpPr>
+            <a:spLocks noGrp="1"/>
+          </p:cNvSpPr>
+          <p:nvPr>
+            <p:ph type="sldNum" sz="quarter" idx="10"/>
+          </p:nvPr>
+        </p:nvSpPr>
+        <p:spPr bwMode="auto"/>
+        <p:txBody>
+          <a:bodyPr/>
+          <a:lstStyle/>
+          <a:p>
+            <a:pPr>
+              <a:defRPr/>
+            </a:pPr>
+            <a:fld id="{1518F43B-0985-7A95-7869-04546C484291}" type="slidenum">
+              <a:rPr/>
+              <a:t/>
+            </a:fld>
+            <a:endParaRPr/>
+          </a:p>
+        </p:txBody>
+      </p:sp>
+    </p:spTree>
+  </p:cSld>
+</p:notes>
+</file>
+
+<file path=ppt/notesSlides/notesSlide5.xml><?xml version="1.0" encoding="utf-8"?>
+<p:notes xmlns:a="http://schemas.openxmlformats.org/drawingml/2006/main" xmlns:r="http://schemas.openxmlformats.org/officeDocument/2006/relationships" xmlns:p="http://schemas.openxmlformats.org/presentationml/2006/main" xmlns:m="http://schemas.openxmlformats.org/officeDocument/2006/math" xmlns:w="http://schemas.openxmlformats.org/wordprocessingml/2006/main">
+  <p:cSld name="">
+    <p:spTree>
+      <p:nvGrpSpPr>
+        <p:cNvPr id="1" name=""/>
+        <p:cNvGrpSpPr/>
+        <p:nvPr/>
+      </p:nvGrpSpPr>
+      <p:grpSpPr bwMode="auto">
+        <a:xfrm>
+          <a:off x="0" y="0"/>
+          <a:ext cx="0" cy="0"/>
+          <a:chOff x="0" y="0"/>
+          <a:chExt cx="0" cy="0"/>
+        </a:xfrm>
+      </p:grpSpPr>
+      <p:sp>
+        <p:nvSpPr>
+          <p:cNvPr id="2" name="Slide Image Placeholder 1"/>
+          <p:cNvSpPr>
+            <a:spLocks noChangeAspect="1" noGrp="1" noRot="1"/>
+          </p:cNvSpPr>
+          <p:nvPr>
+            <p:ph type="sldImg"/>
+          </p:nvPr>
+        </p:nvSpPr>
+        <p:spPr bwMode="auto"/>
+      </p:sp>
+      <p:sp>
+        <p:nvSpPr>
+          <p:cNvPr id="3" name="Notes Placeholder 2"/>
+          <p:cNvSpPr>
+            <a:spLocks noGrp="1"/>
+          </p:cNvSpPr>
+          <p:nvPr>
+            <p:ph type="body" idx="1"/>
+          </p:nvPr>
+        </p:nvSpPr>
+        <p:spPr bwMode="auto"/>
+        <p:txBody>
+          <a:bodyPr/>
+          <a:lstStyle/>
+          <a:p>
+            <a:pPr>
+              <a:defRPr/>
+            </a:pPr>
+            <a:r>
+              <a:rPr lang="es-ES" sz="1200" b="0" i="0" u="none" strike="noStrike" cap="none" spc="0">
+                <a:solidFill>
+                  <a:schemeClr val="tx1"/>
+                </a:solidFill>
+                <a:latin typeface="+mn-lt"/>
+                <a:ea typeface="+mn-ea"/>
+                <a:cs typeface="+mn-cs"/>
+              </a:rPr>
+              <a:t>Soy consciente de que a comparación de las anteriores diapositivas esto es horrible, pero lo que se ha enseñado antes era un prototipo visual y no funcional. Primero me quiero asegurar de que funciona y posteriormente añadir estilo.</a:t>
+            </a:r>
+            <a:endParaRPr/>
+          </a:p>
+        </p:txBody>
+      </p:sp>
+      <p:sp>
+        <p:nvSpPr>
+          <p:cNvPr id="4" name="Slide Number Placeholder 3"/>
+          <p:cNvSpPr>
+            <a:spLocks noGrp="1"/>
+          </p:cNvSpPr>
+          <p:nvPr>
+            <p:ph type="sldNum" sz="quarter" idx="10"/>
+          </p:nvPr>
+        </p:nvSpPr>
+        <p:spPr bwMode="auto"/>
+        <p:txBody>
+          <a:bodyPr/>
+          <a:lstStyle/>
+          <a:p>
+            <a:pPr>
+              <a:defRPr/>
+            </a:pPr>
+            <a:fld id="{473645F5-C625-A81F-31D0-9B64E171ABCC}" type="slidenum">
+              <a:rPr/>
+              <a:t/>
+            </a:fld>
+            <a:endParaRPr/>
+          </a:p>
+        </p:txBody>
+      </p:sp>
+    </p:spTree>
+  </p:cSld>
+</p:notes>
+</file>
+
 <file path=ppt/slideLayouts/slideLayout1.xml><?xml version="1.0" encoding="utf-8"?>
 <p:sldLayout xmlns:a="http://schemas.openxmlformats.org/drawingml/2006/main" xmlns:r="http://schemas.openxmlformats.org/officeDocument/2006/relationships" xmlns:p="http://schemas.openxmlformats.org/presentationml/2006/main" xmlns:m="http://schemas.openxmlformats.org/officeDocument/2006/math" xmlns:w="http://schemas.openxmlformats.org/wordprocessingml/2006/main" matchingName="" preserve="0" showMasterPhAnim="0" showMasterSp="1" type="title" userDrawn="1">
   <p:cSld name="Title Slide">
@@ -4030,7 +4211,7 @@
         <p:spPr bwMode="auto">
           <a:xfrm>
             <a:off x="609599" y="6356351"/>
-            <a:ext cx="2844799" cy="365125"/>
+            <a:ext cx="2844798" cy="365125"/>
           </a:xfrm>
           <a:prstGeom prst="rect">
             <a:avLst/>
@@ -4114,7 +4295,7 @@
         <p:spPr bwMode="auto">
           <a:xfrm>
             <a:off x="8737599" y="6356351"/>
-            <a:ext cx="2844799" cy="365125"/>
+            <a:ext cx="2844798" cy="365125"/>
           </a:xfrm>
           <a:prstGeom prst="rect">
             <a:avLst/>
@@ -4615,7 +4796,7 @@
         <p:spPr bwMode="auto">
           <a:xfrm flipH="0" flipV="0">
             <a:off x="1155997" y="1417638"/>
-            <a:ext cx="9880003" cy="5033700"/>
+            <a:ext cx="9880002" cy="5033700"/>
           </a:xfrm>
           <a:prstGeom prst="rect">
             <a:avLst/>
@@ -4721,6 +4902,220 @@
           <a:xfrm flipH="0" flipV="0">
             <a:off x="561134" y="1317042"/>
             <a:ext cx="11069730" cy="5315776"/>
+          </a:xfrm>
+          <a:prstGeom prst="rect">
+            <a:avLst/>
+          </a:prstGeom>
+        </p:spPr>
+      </p:pic>
+    </p:spTree>
+  </p:cSld>
+  <p:clrMapOvr>
+    <a:masterClrMapping/>
+  </p:clrMapOvr>
+  <mc:AlternateContent xmlns:mc="http://schemas.openxmlformats.org/markup-compatibility/2006">
+    <mc:Choice xmlns:p159="http://schemas.microsoft.com/office/powerpoint/2015/09/main" xmlns:p14="http://schemas.microsoft.com/office/powerpoint/2010/main" Requires="p159">
+      <p:transition p14:dur="2000" advClick="1"/>
+    </mc:Choice>
+    <mc:Fallback>
+      <p:transition advClick="1"/>
+    </mc:Fallback>
+  </mc:AlternateContent>
+</p:sld>
+</file>
+
+<file path=ppt/slides/slide4.xml><?xml version="1.0" encoding="utf-8"?>
+<p:sld xmlns:a="http://schemas.openxmlformats.org/drawingml/2006/main" xmlns:r="http://schemas.openxmlformats.org/officeDocument/2006/relationships" xmlns:p="http://schemas.openxmlformats.org/presentationml/2006/main" xmlns:m="http://schemas.openxmlformats.org/officeDocument/2006/math" xmlns:w="http://schemas.openxmlformats.org/wordprocessingml/2006/main" xmlns:mc="http://schemas.openxmlformats.org/markup-compatibility/2006" showMasterPhAnim="0" showMasterSp="1" show="1">
+  <p:cSld name="">
+    <p:spTree>
+      <p:nvGrpSpPr>
+        <p:cNvPr id="1" name=""/>
+        <p:cNvGrpSpPr/>
+        <p:nvPr/>
+      </p:nvGrpSpPr>
+      <p:grpSpPr bwMode="auto">
+        <a:xfrm>
+          <a:off x="0" y="0"/>
+          <a:ext cx="0" cy="0"/>
+          <a:chOff x="0" y="0"/>
+          <a:chExt cx="0" cy="0"/>
+        </a:xfrm>
+      </p:grpSpPr>
+      <p:sp>
+        <p:nvSpPr>
+          <p:cNvPr id="1715010220" name="Title 1"/>
+          <p:cNvSpPr>
+            <a:spLocks noGrp="1"/>
+          </p:cNvSpPr>
+          <p:nvPr>
+            <p:ph type="title"/>
+          </p:nvPr>
+        </p:nvSpPr>
+        <p:spPr bwMode="auto"/>
+        <p:txBody>
+          <a:bodyPr/>
+          <a:lstStyle/>
+          <a:p>
+            <a:pPr>
+              <a:defRPr/>
+            </a:pPr>
+            <a:r>
+              <a:rPr/>
+              <a:t>Vista ‘create’ de películas</a:t>
+            </a:r>
+            <a:endParaRPr/>
+          </a:p>
+        </p:txBody>
+      </p:sp>
+      <p:sp>
+        <p:nvSpPr>
+          <p:cNvPr id="1046631938" name="Content Placeholder 2"/>
+          <p:cNvSpPr>
+            <a:spLocks noGrp="1"/>
+          </p:cNvSpPr>
+          <p:nvPr>
+            <p:ph idx="1"/>
+          </p:nvPr>
+        </p:nvSpPr>
+        <p:spPr bwMode="auto"/>
+        <p:txBody>
+          <a:bodyPr/>
+          <a:lstStyle/>
+          <a:p>
+            <a:pPr>
+              <a:defRPr/>
+            </a:pPr>
+            <a:r>
+              <a:rPr/>
+              <a:t>(Recién creada) 31/03/2025</a:t>
+            </a:r>
+            <a:endParaRPr/>
+          </a:p>
+        </p:txBody>
+      </p:sp>
+      <p:pic>
+        <p:nvPicPr>
+          <p:cNvPr id="1033648309" name=""/>
+          <p:cNvPicPr>
+            <a:picLocks noChangeAspect="1"/>
+          </p:cNvPicPr>
+          <p:nvPr/>
+        </p:nvPicPr>
+        <p:blipFill>
+          <a:blip r:embed="rId3"/>
+          <a:stretch/>
+        </p:blipFill>
+        <p:spPr bwMode="auto">
+          <a:xfrm flipH="0" flipV="0">
+            <a:off x="551335" y="2567254"/>
+            <a:ext cx="11089326" cy="3739028"/>
+          </a:xfrm>
+          <a:prstGeom prst="rect">
+            <a:avLst/>
+          </a:prstGeom>
+        </p:spPr>
+      </p:pic>
+    </p:spTree>
+  </p:cSld>
+  <p:clrMapOvr>
+    <a:masterClrMapping/>
+  </p:clrMapOvr>
+  <mc:AlternateContent xmlns:mc="http://schemas.openxmlformats.org/markup-compatibility/2006">
+    <mc:Choice xmlns:p159="http://schemas.microsoft.com/office/powerpoint/2015/09/main" xmlns:p14="http://schemas.microsoft.com/office/powerpoint/2010/main" Requires="p159">
+      <p:transition p14:dur="2000" advClick="1"/>
+    </mc:Choice>
+    <mc:Fallback>
+      <p:transition advClick="1"/>
+    </mc:Fallback>
+  </mc:AlternateContent>
+</p:sld>
+</file>
+
+<file path=ppt/slides/slide5.xml><?xml version="1.0" encoding="utf-8"?>
+<p:sld xmlns:a="http://schemas.openxmlformats.org/drawingml/2006/main" xmlns:r="http://schemas.openxmlformats.org/officeDocument/2006/relationships" xmlns:p="http://schemas.openxmlformats.org/presentationml/2006/main" xmlns:m="http://schemas.openxmlformats.org/officeDocument/2006/math" xmlns:w="http://schemas.openxmlformats.org/wordprocessingml/2006/main" xmlns:mc="http://schemas.openxmlformats.org/markup-compatibility/2006" showMasterPhAnim="0" showMasterSp="1" show="1">
+  <p:cSld name="">
+    <p:spTree>
+      <p:nvGrpSpPr>
+        <p:cNvPr id="1" name=""/>
+        <p:cNvGrpSpPr/>
+        <p:nvPr/>
+      </p:nvGrpSpPr>
+      <p:grpSpPr bwMode="auto">
+        <a:xfrm>
+          <a:off x="0" y="0"/>
+          <a:ext cx="0" cy="0"/>
+          <a:chOff x="0" y="0"/>
+          <a:chExt cx="0" cy="0"/>
+        </a:xfrm>
+      </p:grpSpPr>
+      <p:sp>
+        <p:nvSpPr>
+          <p:cNvPr id="709790050" name="Title 1"/>
+          <p:cNvSpPr>
+            <a:spLocks noGrp="1"/>
+          </p:cNvSpPr>
+          <p:nvPr>
+            <p:ph type="title"/>
+          </p:nvPr>
+        </p:nvSpPr>
+        <p:spPr bwMode="auto"/>
+        <p:txBody>
+          <a:bodyPr/>
+          <a:lstStyle/>
+          <a:p>
+            <a:pPr>
+              <a:defRPr/>
+            </a:pPr>
+            <a:r>
+              <a:rPr/>
+              <a:t>Vista ‘index’ de películas</a:t>
+            </a:r>
+            <a:endParaRPr/>
+          </a:p>
+        </p:txBody>
+      </p:sp>
+      <p:sp>
+        <p:nvSpPr>
+          <p:cNvPr id="1395680714" name="Content Placeholder 2"/>
+          <p:cNvSpPr>
+            <a:spLocks noGrp="1"/>
+          </p:cNvSpPr>
+          <p:nvPr>
+            <p:ph idx="1"/>
+          </p:nvPr>
+        </p:nvSpPr>
+        <p:spPr bwMode="auto"/>
+        <p:txBody>
+          <a:bodyPr/>
+          <a:lstStyle/>
+          <a:p>
+            <a:pPr>
+              <a:defRPr/>
+            </a:pPr>
+            <a:r>
+              <a:rPr/>
+              <a:t>(Recién creada) 31/03/2025</a:t>
+            </a:r>
+            <a:endParaRPr/>
+          </a:p>
+        </p:txBody>
+      </p:sp>
+      <p:pic>
+        <p:nvPicPr>
+          <p:cNvPr id="112511495" name=""/>
+          <p:cNvPicPr>
+            <a:picLocks noChangeAspect="1"/>
+          </p:cNvPicPr>
+          <p:nvPr/>
+        </p:nvPicPr>
+        <p:blipFill>
+          <a:blip r:embed="rId3"/>
+          <a:stretch/>
+        </p:blipFill>
+        <p:spPr bwMode="auto">
+          <a:xfrm flipH="0" flipV="0">
+            <a:off x="1993493" y="2280927"/>
+            <a:ext cx="8205011" cy="4581223"/>
           </a:xfrm>
           <a:prstGeom prst="rect">
             <a:avLst/>

</xml_diff>

<commit_message>
Añadido contenido a presentación de evolución de estilo visual
</commit_message>
<xml_diff>
--- a/Evolución visual.pptx
+++ b/Evolución visual.pptx
@@ -5,7 +5,7 @@
     <p:sldMasterId id="2147483648" r:id="rId1"/>
   </p:sldMasterIdLst>
   <p:notesMasterIdLst>
-    <p:notesMasterId r:id="rId9"/>
+    <p:notesMasterId r:id="rId11"/>
   </p:notesMasterIdLst>
   <p:sldIdLst>
     <p:sldId id="256" r:id="rId4"/>
@@ -13,6 +13,8 @@
     <p:sldId id="258" r:id="rId6"/>
     <p:sldId id="259" r:id="rId7"/>
     <p:sldId id="260" r:id="rId8"/>
+    <p:sldId id="261" r:id="rId9"/>
+    <p:sldId id="262" r:id="rId10"/>
   </p:sldIdLst>
   <p:sldSz cx="12192000" cy="6858000"/>
   <p:notesSz cx="6858000" cy="9144000"/>
@@ -909,6 +911,170 @@
               <a:defRPr/>
             </a:pPr>
             <a:fld id="{473645F5-C625-A81F-31D0-9B64E171ABCC}" type="slidenum">
+              <a:rPr/>
+              <a:t/>
+            </a:fld>
+            <a:endParaRPr/>
+          </a:p>
+        </p:txBody>
+      </p:sp>
+    </p:spTree>
+  </p:cSld>
+</p:notes>
+</file>
+
+<file path=ppt/notesSlides/notesSlide6.xml><?xml version="1.0" encoding="utf-8"?>
+<p:notes xmlns:a="http://schemas.openxmlformats.org/drawingml/2006/main" xmlns:r="http://schemas.openxmlformats.org/officeDocument/2006/relationships" xmlns:p="http://schemas.openxmlformats.org/presentationml/2006/main" xmlns:m="http://schemas.openxmlformats.org/officeDocument/2006/math" xmlns:w="http://schemas.openxmlformats.org/wordprocessingml/2006/main">
+  <p:cSld name="">
+    <p:spTree>
+      <p:nvGrpSpPr>
+        <p:cNvPr id="1" name=""/>
+        <p:cNvGrpSpPr/>
+        <p:nvPr/>
+      </p:nvGrpSpPr>
+      <p:grpSpPr bwMode="auto">
+        <a:xfrm>
+          <a:off x="0" y="0"/>
+          <a:ext cx="0" cy="0"/>
+          <a:chOff x="0" y="0"/>
+          <a:chExt cx="0" cy="0"/>
+        </a:xfrm>
+      </p:grpSpPr>
+      <p:sp>
+        <p:nvSpPr>
+          <p:cNvPr id="2" name="Slide Image Placeholder 1"/>
+          <p:cNvSpPr>
+            <a:spLocks noChangeAspect="1" noGrp="1" noRot="1"/>
+          </p:cNvSpPr>
+          <p:nvPr>
+            <p:ph type="sldImg"/>
+          </p:nvPr>
+        </p:nvSpPr>
+        <p:spPr bwMode="auto"/>
+      </p:sp>
+      <p:sp>
+        <p:nvSpPr>
+          <p:cNvPr id="3" name="Notes Placeholder 2"/>
+          <p:cNvSpPr>
+            <a:spLocks noGrp="1"/>
+          </p:cNvSpPr>
+          <p:nvPr>
+            <p:ph type="body" idx="1"/>
+          </p:nvPr>
+        </p:nvSpPr>
+        <p:spPr bwMode="auto"/>
+        <p:txBody>
+          <a:bodyPr/>
+          <a:lstStyle/>
+          <a:p>
+            <a:pPr>
+              <a:defRPr/>
+            </a:pPr>
+            <a:endParaRPr/>
+          </a:p>
+        </p:txBody>
+      </p:sp>
+      <p:sp>
+        <p:nvSpPr>
+          <p:cNvPr id="4" name="Slide Number Placeholder 3"/>
+          <p:cNvSpPr>
+            <a:spLocks noGrp="1"/>
+          </p:cNvSpPr>
+          <p:nvPr>
+            <p:ph type="sldNum" sz="quarter" idx="10"/>
+          </p:nvPr>
+        </p:nvSpPr>
+        <p:spPr bwMode="auto"/>
+        <p:txBody>
+          <a:bodyPr/>
+          <a:lstStyle/>
+          <a:p>
+            <a:pPr>
+              <a:defRPr/>
+            </a:pPr>
+            <a:fld id="{E5DFF747-ECE5-3A15-3792-7DF053F73861}" type="slidenum">
+              <a:rPr/>
+              <a:t/>
+            </a:fld>
+            <a:endParaRPr/>
+          </a:p>
+        </p:txBody>
+      </p:sp>
+    </p:spTree>
+  </p:cSld>
+</p:notes>
+</file>
+
+<file path=ppt/notesSlides/notesSlide7.xml><?xml version="1.0" encoding="utf-8"?>
+<p:notes xmlns:a="http://schemas.openxmlformats.org/drawingml/2006/main" xmlns:r="http://schemas.openxmlformats.org/officeDocument/2006/relationships" xmlns:p="http://schemas.openxmlformats.org/presentationml/2006/main" xmlns:m="http://schemas.openxmlformats.org/officeDocument/2006/math" xmlns:w="http://schemas.openxmlformats.org/wordprocessingml/2006/main">
+  <p:cSld name="">
+    <p:spTree>
+      <p:nvGrpSpPr>
+        <p:cNvPr id="1" name=""/>
+        <p:cNvGrpSpPr/>
+        <p:nvPr/>
+      </p:nvGrpSpPr>
+      <p:grpSpPr bwMode="auto">
+        <a:xfrm>
+          <a:off x="0" y="0"/>
+          <a:ext cx="0" cy="0"/>
+          <a:chOff x="0" y="0"/>
+          <a:chExt cx="0" cy="0"/>
+        </a:xfrm>
+      </p:grpSpPr>
+      <p:sp>
+        <p:nvSpPr>
+          <p:cNvPr id="2" name="Slide Image Placeholder 1"/>
+          <p:cNvSpPr>
+            <a:spLocks noChangeAspect="1" noGrp="1" noRot="1"/>
+          </p:cNvSpPr>
+          <p:nvPr>
+            <p:ph type="sldImg"/>
+          </p:nvPr>
+        </p:nvSpPr>
+        <p:spPr bwMode="auto"/>
+      </p:sp>
+      <p:sp>
+        <p:nvSpPr>
+          <p:cNvPr id="3" name="Notes Placeholder 2"/>
+          <p:cNvSpPr>
+            <a:spLocks noGrp="1"/>
+          </p:cNvSpPr>
+          <p:nvPr>
+            <p:ph type="body" idx="1"/>
+          </p:nvPr>
+        </p:nvSpPr>
+        <p:spPr bwMode="auto"/>
+        <p:txBody>
+          <a:bodyPr/>
+          <a:lstStyle/>
+          <a:p>
+            <a:pPr>
+              <a:defRPr/>
+            </a:pPr>
+            <a:endParaRPr/>
+          </a:p>
+        </p:txBody>
+      </p:sp>
+      <p:sp>
+        <p:nvSpPr>
+          <p:cNvPr id="4" name="Slide Number Placeholder 3"/>
+          <p:cNvSpPr>
+            <a:spLocks noGrp="1"/>
+          </p:cNvSpPr>
+          <p:nvPr>
+            <p:ph type="sldNum" sz="quarter" idx="10"/>
+          </p:nvPr>
+        </p:nvSpPr>
+        <p:spPr bwMode="auto"/>
+        <p:txBody>
+          <a:bodyPr/>
+          <a:lstStyle/>
+          <a:p>
+            <a:pPr>
+              <a:defRPr/>
+            </a:pPr>
+            <a:fld id="{6D15784E-C067-D48C-5D72-37359B6908C0}" type="slidenum">
               <a:rPr/>
               <a:t/>
             </a:fld>
@@ -5116,6 +5282,363 @@
           <a:xfrm flipH="0" flipV="0">
             <a:off x="1993493" y="2280927"/>
             <a:ext cx="8205011" cy="4581223"/>
+          </a:xfrm>
+          <a:prstGeom prst="rect">
+            <a:avLst/>
+          </a:prstGeom>
+        </p:spPr>
+      </p:pic>
+    </p:spTree>
+  </p:cSld>
+  <p:clrMapOvr>
+    <a:masterClrMapping/>
+  </p:clrMapOvr>
+  <mc:AlternateContent xmlns:mc="http://schemas.openxmlformats.org/markup-compatibility/2006">
+    <mc:Choice xmlns:p159="http://schemas.microsoft.com/office/powerpoint/2015/09/main" xmlns:p14="http://schemas.microsoft.com/office/powerpoint/2010/main" Requires="p159">
+      <p:transition p14:dur="2000" advClick="1"/>
+    </mc:Choice>
+    <mc:Fallback>
+      <p:transition advClick="1"/>
+    </mc:Fallback>
+  </mc:AlternateContent>
+</p:sld>
+</file>
+
+<file path=ppt/slides/slide6.xml><?xml version="1.0" encoding="utf-8"?>
+<p:sld xmlns:a="http://schemas.openxmlformats.org/drawingml/2006/main" xmlns:r="http://schemas.openxmlformats.org/officeDocument/2006/relationships" xmlns:p="http://schemas.openxmlformats.org/presentationml/2006/main" xmlns:m="http://schemas.openxmlformats.org/officeDocument/2006/math" xmlns:w="http://schemas.openxmlformats.org/wordprocessingml/2006/main" xmlns:mc="http://schemas.openxmlformats.org/markup-compatibility/2006" showMasterPhAnim="0" showMasterSp="1" show="1">
+  <p:cSld name="">
+    <p:spTree>
+      <p:nvGrpSpPr>
+        <p:cNvPr id="1" name=""/>
+        <p:cNvGrpSpPr/>
+        <p:nvPr/>
+      </p:nvGrpSpPr>
+      <p:grpSpPr bwMode="auto">
+        <a:xfrm>
+          <a:off x="0" y="0"/>
+          <a:ext cx="0" cy="0"/>
+          <a:chOff x="0" y="0"/>
+          <a:chExt cx="0" cy="0"/>
+        </a:xfrm>
+      </p:grpSpPr>
+      <p:sp>
+        <p:nvSpPr>
+          <p:cNvPr id="1092298972" name="Title 1"/>
+          <p:cNvSpPr>
+            <a:spLocks noGrp="1"/>
+          </p:cNvSpPr>
+          <p:nvPr>
+            <p:ph type="title"/>
+          </p:nvPr>
+        </p:nvSpPr>
+        <p:spPr bwMode="auto"/>
+        <p:txBody>
+          <a:bodyPr/>
+          <a:lstStyle/>
+          <a:p>
+            <a:pPr>
+              <a:defRPr/>
+            </a:pPr>
+            <a:r>
+              <a:rPr/>
+              <a:t>Vista de una película concreta</a:t>
+            </a:r>
+            <a:endParaRPr/>
+          </a:p>
+        </p:txBody>
+      </p:sp>
+      <p:sp>
+        <p:nvSpPr>
+          <p:cNvPr id="1481975993" name="Content Placeholder 2"/>
+          <p:cNvSpPr>
+            <a:spLocks noGrp="1"/>
+          </p:cNvSpPr>
+          <p:nvPr>
+            <p:ph idx="1"/>
+          </p:nvPr>
+        </p:nvSpPr>
+        <p:spPr bwMode="auto"/>
+        <p:txBody>
+          <a:bodyPr/>
+          <a:lstStyle/>
+          <a:p>
+            <a:pPr>
+              <a:defRPr/>
+            </a:pPr>
+            <a:r>
+              <a:rPr/>
+              <a:t>(Recién creada) 01/04/2025</a:t>
+            </a:r>
+            <a:endParaRPr/>
+          </a:p>
+        </p:txBody>
+      </p:sp>
+      <p:sp>
+        <p:nvSpPr>
+          <p:cNvPr id="16700067" name="Content Placeholder 3"/>
+          <p:cNvSpPr>
+            <a:spLocks noGrp="1"/>
+          </p:cNvSpPr>
+          <p:nvPr>
+            <p:ph sz="half" idx="2"/>
+          </p:nvPr>
+        </p:nvSpPr>
+        <p:spPr bwMode="auto">
+          <a:xfrm>
+            <a:off x="6197598" y="1600200"/>
+            <a:ext cx="5384799" cy="4525961"/>
+          </a:xfrm>
+        </p:spPr>
+        <p:txBody>
+          <a:bodyPr/>
+          <a:lstStyle>
+            <a:lvl1pPr>
+              <a:defRPr sz="2800"/>
+            </a:lvl1pPr>
+            <a:lvl2pPr>
+              <a:defRPr sz="2400"/>
+            </a:lvl2pPr>
+            <a:lvl3pPr>
+              <a:defRPr sz="2000"/>
+            </a:lvl3pPr>
+            <a:lvl4pPr>
+              <a:defRPr sz="1800"/>
+            </a:lvl4pPr>
+            <a:lvl5pPr>
+              <a:defRPr sz="1800"/>
+            </a:lvl5pPr>
+            <a:lvl6pPr>
+              <a:defRPr sz="1800"/>
+            </a:lvl6pPr>
+            <a:lvl7pPr>
+              <a:defRPr sz="1800"/>
+            </a:lvl7pPr>
+            <a:lvl8pPr>
+              <a:defRPr sz="1800"/>
+            </a:lvl8pPr>
+            <a:lvl9pPr>
+              <a:defRPr sz="1800"/>
+            </a:lvl9pPr>
+          </a:lstStyle>
+          <a:p>
+            <a:pPr>
+              <a:defRPr/>
+            </a:pPr>
+            <a:endParaRPr/>
+          </a:p>
+        </p:txBody>
+      </p:sp>
+      <p:pic>
+        <p:nvPicPr>
+          <p:cNvPr id="577371610" name=""/>
+          <p:cNvPicPr>
+            <a:picLocks noChangeAspect="1"/>
+          </p:cNvPicPr>
+          <p:nvPr/>
+        </p:nvPicPr>
+        <p:blipFill>
+          <a:blip r:embed="rId3"/>
+          <a:stretch/>
+        </p:blipFill>
+        <p:spPr bwMode="auto">
+          <a:xfrm flipH="0" flipV="0">
+            <a:off x="7422800" y="1340177"/>
+            <a:ext cx="2934394" cy="5217418"/>
+          </a:xfrm>
+          <a:prstGeom prst="rect">
+            <a:avLst/>
+          </a:prstGeom>
+        </p:spPr>
+      </p:pic>
+    </p:spTree>
+  </p:cSld>
+  <p:clrMapOvr>
+    <a:masterClrMapping/>
+  </p:clrMapOvr>
+  <mc:AlternateContent xmlns:mc="http://schemas.openxmlformats.org/markup-compatibility/2006">
+    <mc:Choice xmlns:p159="http://schemas.microsoft.com/office/powerpoint/2015/09/main" xmlns:p14="http://schemas.microsoft.com/office/powerpoint/2010/main" Requires="p159">
+      <p:transition p14:dur="2000" advClick="1"/>
+    </mc:Choice>
+    <mc:Fallback>
+      <p:transition advClick="1"/>
+    </mc:Fallback>
+  </mc:AlternateContent>
+</p:sld>
+</file>
+
+<file path=ppt/slides/slide7.xml><?xml version="1.0" encoding="utf-8"?>
+<p:sld xmlns:a="http://schemas.openxmlformats.org/drawingml/2006/main" xmlns:r="http://schemas.openxmlformats.org/officeDocument/2006/relationships" xmlns:p="http://schemas.openxmlformats.org/presentationml/2006/main" xmlns:m="http://schemas.openxmlformats.org/officeDocument/2006/math" xmlns:w="http://schemas.openxmlformats.org/wordprocessingml/2006/main" xmlns:mc="http://schemas.openxmlformats.org/markup-compatibility/2006" showMasterPhAnim="0" showMasterSp="1" show="1">
+  <p:cSld name="">
+    <p:spTree>
+      <p:nvGrpSpPr>
+        <p:cNvPr id="1" name=""/>
+        <p:cNvGrpSpPr/>
+        <p:nvPr/>
+      </p:nvGrpSpPr>
+      <p:grpSpPr bwMode="auto">
+        <a:xfrm>
+          <a:off x="0" y="0"/>
+          <a:ext cx="0" cy="0"/>
+          <a:chOff x="0" y="0"/>
+          <a:chExt cx="0" cy="0"/>
+        </a:xfrm>
+      </p:grpSpPr>
+      <p:sp>
+        <p:nvSpPr>
+          <p:cNvPr id="2141470993" name="Title 1"/>
+          <p:cNvSpPr>
+            <a:spLocks noGrp="1"/>
+          </p:cNvSpPr>
+          <p:nvPr>
+            <p:ph type="title"/>
+          </p:nvPr>
+        </p:nvSpPr>
+        <p:spPr bwMode="auto"/>
+        <p:txBody>
+          <a:bodyPr/>
+          <a:lstStyle/>
+          <a:p>
+            <a:pPr>
+              <a:defRPr/>
+            </a:pPr>
+            <a:r>
+              <a:rPr/>
+              <a:t>Edición de una película</a:t>
+            </a:r>
+            <a:endParaRPr/>
+          </a:p>
+        </p:txBody>
+      </p:sp>
+      <p:sp>
+        <p:nvSpPr>
+          <p:cNvPr id="453144650" name="Content Placeholder 2"/>
+          <p:cNvSpPr>
+            <a:spLocks noGrp="1"/>
+          </p:cNvSpPr>
+          <p:nvPr>
+            <p:ph sz="half" idx="1"/>
+          </p:nvPr>
+        </p:nvSpPr>
+        <p:spPr bwMode="auto">
+          <a:xfrm>
+            <a:off x="609598" y="1600200"/>
+            <a:ext cx="5384799" cy="4525961"/>
+          </a:xfrm>
+        </p:spPr>
+        <p:txBody>
+          <a:bodyPr/>
+          <a:lstStyle>
+            <a:lvl1pPr>
+              <a:defRPr sz="2800"/>
+            </a:lvl1pPr>
+            <a:lvl2pPr>
+              <a:defRPr sz="2400"/>
+            </a:lvl2pPr>
+            <a:lvl3pPr>
+              <a:defRPr sz="2000"/>
+            </a:lvl3pPr>
+            <a:lvl4pPr>
+              <a:defRPr sz="1800"/>
+            </a:lvl4pPr>
+            <a:lvl5pPr>
+              <a:defRPr sz="1800"/>
+            </a:lvl5pPr>
+            <a:lvl6pPr>
+              <a:defRPr sz="1800"/>
+            </a:lvl6pPr>
+            <a:lvl7pPr>
+              <a:defRPr sz="1800"/>
+            </a:lvl7pPr>
+            <a:lvl8pPr>
+              <a:defRPr sz="1800"/>
+            </a:lvl8pPr>
+            <a:lvl9pPr>
+              <a:defRPr sz="1800"/>
+            </a:lvl9pPr>
+          </a:lstStyle>
+          <a:p>
+            <a:pPr>
+              <a:defRPr/>
+            </a:pPr>
+            <a:r>
+              <a:rPr/>
+              <a:t>(Recién creada) 01/04/2025</a:t>
+            </a:r>
+            <a:endParaRPr/>
+          </a:p>
+        </p:txBody>
+      </p:sp>
+      <p:sp>
+        <p:nvSpPr>
+          <p:cNvPr id="527643100" name="Content Placeholder 3"/>
+          <p:cNvSpPr>
+            <a:spLocks noGrp="1"/>
+          </p:cNvSpPr>
+          <p:nvPr>
+            <p:ph sz="half" idx="2"/>
+          </p:nvPr>
+        </p:nvSpPr>
+        <p:spPr bwMode="auto">
+          <a:xfrm>
+            <a:off x="6197598" y="1600200"/>
+            <a:ext cx="5384799" cy="4525961"/>
+          </a:xfrm>
+        </p:spPr>
+        <p:txBody>
+          <a:bodyPr/>
+          <a:lstStyle>
+            <a:lvl1pPr>
+              <a:defRPr sz="2800"/>
+            </a:lvl1pPr>
+            <a:lvl2pPr>
+              <a:defRPr sz="2400"/>
+            </a:lvl2pPr>
+            <a:lvl3pPr>
+              <a:defRPr sz="2000"/>
+            </a:lvl3pPr>
+            <a:lvl4pPr>
+              <a:defRPr sz="1800"/>
+            </a:lvl4pPr>
+            <a:lvl5pPr>
+              <a:defRPr sz="1800"/>
+            </a:lvl5pPr>
+            <a:lvl6pPr>
+              <a:defRPr sz="1800"/>
+            </a:lvl6pPr>
+            <a:lvl7pPr>
+              <a:defRPr sz="1800"/>
+            </a:lvl7pPr>
+            <a:lvl8pPr>
+              <a:defRPr sz="1800"/>
+            </a:lvl8pPr>
+            <a:lvl9pPr>
+              <a:defRPr sz="1800"/>
+            </a:lvl9pPr>
+          </a:lstStyle>
+          <a:p>
+            <a:pPr>
+              <a:defRPr/>
+            </a:pPr>
+            <a:endParaRPr/>
+          </a:p>
+        </p:txBody>
+      </p:sp>
+      <p:pic>
+        <p:nvPicPr>
+          <p:cNvPr id="1003471005" name=""/>
+          <p:cNvPicPr>
+            <a:picLocks noChangeAspect="1"/>
+          </p:cNvPicPr>
+          <p:nvPr/>
+        </p:nvPicPr>
+        <p:blipFill>
+          <a:blip r:embed="rId3"/>
+          <a:stretch/>
+        </p:blipFill>
+        <p:spPr bwMode="auto">
+          <a:xfrm flipH="0" flipV="0">
+            <a:off x="6884257" y="1600200"/>
+            <a:ext cx="4011481" cy="5198940"/>
           </a:xfrm>
           <a:prstGeom prst="rect">
             <a:avLst/>

</xml_diff>

<commit_message>
Actualizada la presentación estilo visual
</commit_message>
<xml_diff>
--- a/Evolución visual.pptx
+++ b/Evolución visual.pptx
@@ -5,7 +5,7 @@
     <p:sldMasterId id="2147483648" r:id="rId1"/>
   </p:sldMasterIdLst>
   <p:notesMasterIdLst>
-    <p:notesMasterId r:id="rId15"/>
+    <p:notesMasterId r:id="rId16"/>
   </p:notesMasterIdLst>
   <p:sldIdLst>
     <p:sldId id="256" r:id="rId4"/>
@@ -19,6 +19,7 @@
     <p:sldId id="264" r:id="rId12"/>
     <p:sldId id="265" r:id="rId13"/>
     <p:sldId id="266" r:id="rId14"/>
+    <p:sldId id="267" r:id="rId15"/>
   </p:sldIdLst>
   <p:sldSz cx="12192000" cy="6858000"/>
   <p:notesSz cx="6858000" cy="9144000"/>
@@ -736,6 +737,88 @@
               <a:defRPr/>
             </a:pPr>
             <a:fld id="{311D0BB5-FFA4-4DFC-ACF2-CC5C76E474C7}" type="slidenum">
+              <a:rPr/>
+              <a:t/>
+            </a:fld>
+            <a:endParaRPr/>
+          </a:p>
+        </p:txBody>
+      </p:sp>
+    </p:spTree>
+  </p:cSld>
+</p:notes>
+</file>
+
+<file path=ppt/notesSlides/notesSlide12.xml><?xml version="1.0" encoding="utf-8"?>
+<p:notes xmlns:a="http://schemas.openxmlformats.org/drawingml/2006/main" xmlns:r="http://schemas.openxmlformats.org/officeDocument/2006/relationships" xmlns:p="http://schemas.openxmlformats.org/presentationml/2006/main" xmlns:m="http://schemas.openxmlformats.org/officeDocument/2006/math" xmlns:w="http://schemas.openxmlformats.org/wordprocessingml/2006/main">
+  <p:cSld name="">
+    <p:spTree>
+      <p:nvGrpSpPr>
+        <p:cNvPr id="1" name=""/>
+        <p:cNvGrpSpPr/>
+        <p:nvPr/>
+      </p:nvGrpSpPr>
+      <p:grpSpPr bwMode="auto">
+        <a:xfrm>
+          <a:off x="0" y="0"/>
+          <a:ext cx="0" cy="0"/>
+          <a:chOff x="0" y="0"/>
+          <a:chExt cx="0" cy="0"/>
+        </a:xfrm>
+      </p:grpSpPr>
+      <p:sp>
+        <p:nvSpPr>
+          <p:cNvPr id="2" name="Slide Image Placeholder 1"/>
+          <p:cNvSpPr>
+            <a:spLocks noChangeAspect="1" noGrp="1" noRot="1"/>
+          </p:cNvSpPr>
+          <p:nvPr>
+            <p:ph type="sldImg"/>
+          </p:nvPr>
+        </p:nvSpPr>
+        <p:spPr bwMode="auto"/>
+      </p:sp>
+      <p:sp>
+        <p:nvSpPr>
+          <p:cNvPr id="3" name="Notes Placeholder 2"/>
+          <p:cNvSpPr>
+            <a:spLocks noGrp="1"/>
+          </p:cNvSpPr>
+          <p:nvPr>
+            <p:ph type="body" idx="1"/>
+          </p:nvPr>
+        </p:nvSpPr>
+        <p:spPr bwMode="auto"/>
+        <p:txBody>
+          <a:bodyPr/>
+          <a:lstStyle/>
+          <a:p>
+            <a:pPr>
+              <a:defRPr/>
+            </a:pPr>
+            <a:endParaRPr/>
+          </a:p>
+        </p:txBody>
+      </p:sp>
+      <p:sp>
+        <p:nvSpPr>
+          <p:cNvPr id="4" name="Slide Number Placeholder 3"/>
+          <p:cNvSpPr>
+            <a:spLocks noGrp="1"/>
+          </p:cNvSpPr>
+          <p:nvPr>
+            <p:ph type="sldNum" sz="quarter" idx="10"/>
+          </p:nvPr>
+        </p:nvSpPr>
+        <p:spPr bwMode="auto"/>
+        <p:txBody>
+          <a:bodyPr/>
+          <a:lstStyle/>
+          <a:p>
+            <a:pPr>
+              <a:defRPr/>
+            </a:pPr>
+            <a:fld id="{1EF31FD8-CB2F-4FC8-D67C-AA883F6A2607}" type="slidenum">
               <a:rPr/>
               <a:t/>
             </a:fld>
@@ -5582,6 +5665,201 @@
           <a:xfrm flipH="0" flipV="0">
             <a:off x="6197598" y="1276838"/>
             <a:ext cx="5522962" cy="5172685"/>
+          </a:xfrm>
+          <a:prstGeom prst="rect">
+            <a:avLst/>
+          </a:prstGeom>
+        </p:spPr>
+      </p:pic>
+    </p:spTree>
+  </p:cSld>
+  <p:clrMapOvr>
+    <a:masterClrMapping/>
+  </p:clrMapOvr>
+  <mc:AlternateContent xmlns:mc="http://schemas.openxmlformats.org/markup-compatibility/2006">
+    <mc:Choice xmlns:p159="http://schemas.microsoft.com/office/powerpoint/2015/09/main" xmlns:p14="http://schemas.microsoft.com/office/powerpoint/2010/main" Requires="p159">
+      <p:transition p14:dur="2000" advClick="1"/>
+    </mc:Choice>
+    <mc:Fallback>
+      <p:transition advClick="1"/>
+    </mc:Fallback>
+  </mc:AlternateContent>
+</p:sld>
+</file>
+
+<file path=ppt/slides/slide12.xml><?xml version="1.0" encoding="utf-8"?>
+<p:sld xmlns:a="http://schemas.openxmlformats.org/drawingml/2006/main" xmlns:r="http://schemas.openxmlformats.org/officeDocument/2006/relationships" xmlns:p="http://schemas.openxmlformats.org/presentationml/2006/main" xmlns:m="http://schemas.openxmlformats.org/officeDocument/2006/math" xmlns:w="http://schemas.openxmlformats.org/wordprocessingml/2006/main" xmlns:mc="http://schemas.openxmlformats.org/markup-compatibility/2006" showMasterPhAnim="0" showMasterSp="1" show="1">
+  <p:cSld name="">
+    <p:spTree>
+      <p:nvGrpSpPr>
+        <p:cNvPr id="1" name=""/>
+        <p:cNvGrpSpPr/>
+        <p:nvPr/>
+      </p:nvGrpSpPr>
+      <p:grpSpPr bwMode="auto">
+        <a:xfrm>
+          <a:off x="0" y="0"/>
+          <a:ext cx="0" cy="0"/>
+          <a:chOff x="0" y="0"/>
+          <a:chExt cx="0" cy="0"/>
+        </a:xfrm>
+      </p:grpSpPr>
+      <p:sp>
+        <p:nvSpPr>
+          <p:cNvPr id="749247319" name="Title 1"/>
+          <p:cNvSpPr>
+            <a:spLocks noGrp="1"/>
+          </p:cNvSpPr>
+          <p:nvPr>
+            <p:ph type="title"/>
+          </p:nvPr>
+        </p:nvSpPr>
+        <p:spPr bwMode="auto"/>
+        <p:txBody>
+          <a:bodyPr/>
+          <a:lstStyle/>
+          <a:p>
+            <a:pPr>
+              <a:defRPr/>
+            </a:pPr>
+            <a:r>
+              <a:rPr/>
+              <a:t>Vista ‘my_profile’ del usuario</a:t>
+            </a:r>
+            <a:endParaRPr/>
+          </a:p>
+        </p:txBody>
+      </p:sp>
+      <p:sp>
+        <p:nvSpPr>
+          <p:cNvPr id="523803378" name="Content Placeholder 2"/>
+          <p:cNvSpPr>
+            <a:spLocks noGrp="1"/>
+          </p:cNvSpPr>
+          <p:nvPr>
+            <p:ph sz="half" idx="1"/>
+          </p:nvPr>
+        </p:nvSpPr>
+        <p:spPr bwMode="auto">
+          <a:xfrm>
+            <a:off x="609598" y="1600200"/>
+            <a:ext cx="5384799" cy="4525961"/>
+          </a:xfrm>
+        </p:spPr>
+        <p:txBody>
+          <a:bodyPr/>
+          <a:lstStyle>
+            <a:lvl1pPr>
+              <a:defRPr sz="2800"/>
+            </a:lvl1pPr>
+            <a:lvl2pPr>
+              <a:defRPr sz="2400"/>
+            </a:lvl2pPr>
+            <a:lvl3pPr>
+              <a:defRPr sz="2000"/>
+            </a:lvl3pPr>
+            <a:lvl4pPr>
+              <a:defRPr sz="1800"/>
+            </a:lvl4pPr>
+            <a:lvl5pPr>
+              <a:defRPr sz="1800"/>
+            </a:lvl5pPr>
+            <a:lvl6pPr>
+              <a:defRPr sz="1800"/>
+            </a:lvl6pPr>
+            <a:lvl7pPr>
+              <a:defRPr sz="1800"/>
+            </a:lvl7pPr>
+            <a:lvl8pPr>
+              <a:defRPr sz="1800"/>
+            </a:lvl8pPr>
+            <a:lvl9pPr>
+              <a:defRPr sz="1800"/>
+            </a:lvl9pPr>
+          </a:lstStyle>
+          <a:p>
+            <a:pPr>
+              <a:defRPr/>
+            </a:pPr>
+            <a:r>
+              <a:rPr/>
+              <a:t>(Recién creada) 10/04/2025</a:t>
+            </a:r>
+            <a:endParaRPr/>
+          </a:p>
+        </p:txBody>
+      </p:sp>
+      <p:sp>
+        <p:nvSpPr>
+          <p:cNvPr id="759440813" name="Content Placeholder 3"/>
+          <p:cNvSpPr>
+            <a:spLocks noGrp="1"/>
+          </p:cNvSpPr>
+          <p:nvPr>
+            <p:ph sz="half" idx="2"/>
+          </p:nvPr>
+        </p:nvSpPr>
+        <p:spPr bwMode="auto">
+          <a:xfrm>
+            <a:off x="6197598" y="1600200"/>
+            <a:ext cx="5384799" cy="4525961"/>
+          </a:xfrm>
+        </p:spPr>
+        <p:txBody>
+          <a:bodyPr/>
+          <a:lstStyle>
+            <a:lvl1pPr>
+              <a:defRPr sz="2800"/>
+            </a:lvl1pPr>
+            <a:lvl2pPr>
+              <a:defRPr sz="2400"/>
+            </a:lvl2pPr>
+            <a:lvl3pPr>
+              <a:defRPr sz="2000"/>
+            </a:lvl3pPr>
+            <a:lvl4pPr>
+              <a:defRPr sz="1800"/>
+            </a:lvl4pPr>
+            <a:lvl5pPr>
+              <a:defRPr sz="1800"/>
+            </a:lvl5pPr>
+            <a:lvl6pPr>
+              <a:defRPr sz="1800"/>
+            </a:lvl6pPr>
+            <a:lvl7pPr>
+              <a:defRPr sz="1800"/>
+            </a:lvl7pPr>
+            <a:lvl8pPr>
+              <a:defRPr sz="1800"/>
+            </a:lvl8pPr>
+            <a:lvl9pPr>
+              <a:defRPr sz="1800"/>
+            </a:lvl9pPr>
+          </a:lstStyle>
+          <a:p>
+            <a:pPr>
+              <a:defRPr/>
+            </a:pPr>
+            <a:endParaRPr/>
+          </a:p>
+        </p:txBody>
+      </p:sp>
+      <p:pic>
+        <p:nvPicPr>
+          <p:cNvPr id="2145998188" name=""/>
+          <p:cNvPicPr>
+            <a:picLocks noChangeAspect="1"/>
+          </p:cNvPicPr>
+          <p:nvPr/>
+        </p:nvPicPr>
+        <p:blipFill>
+          <a:blip r:embed="rId3"/>
+          <a:stretch/>
+        </p:blipFill>
+        <p:spPr bwMode="auto">
+          <a:xfrm flipH="0" flipV="0">
+            <a:off x="7247041" y="1184519"/>
+            <a:ext cx="3285914" cy="5544134"/>
           </a:xfrm>
           <a:prstGeom prst="rect">
             <a:avLst/>

</xml_diff>

<commit_message>
Modificada la presentación de evolución de estilo visual
</commit_message>
<xml_diff>
--- a/Evolución visual.pptx
+++ b/Evolución visual.pptx
@@ -5,7 +5,7 @@
     <p:sldMasterId id="2147483648" r:id="rId1"/>
   </p:sldMasterIdLst>
   <p:notesMasterIdLst>
-    <p:notesMasterId r:id="rId16"/>
+    <p:notesMasterId r:id="rId18"/>
   </p:notesMasterIdLst>
   <p:sldIdLst>
     <p:sldId id="256" r:id="rId4"/>
@@ -20,6 +20,8 @@
     <p:sldId id="265" r:id="rId13"/>
     <p:sldId id="266" r:id="rId14"/>
     <p:sldId id="267" r:id="rId15"/>
+    <p:sldId id="268" r:id="rId16"/>
+    <p:sldId id="269" r:id="rId17"/>
   </p:sldIdLst>
   <p:sldSz cx="12192000" cy="6858000"/>
   <p:notesSz cx="6858000" cy="9144000"/>
@@ -145,7 +147,7 @@
       </p:grpSpPr>
       <p:sp>
         <p:nvSpPr>
-          <p:cNvPr id="2" name="Marcador de encabezado 1"/>
+          <p:cNvPr id="1419756433" name="Marcador de encabezado 1"/>
           <p:cNvSpPr>
             <a:spLocks noGrp="1"/>
           </p:cNvSpPr>
@@ -179,7 +181,7 @@
       </p:sp>
       <p:sp>
         <p:nvSpPr>
-          <p:cNvPr id="3" name="Marcador de fecha 2"/>
+          <p:cNvPr id="1570567300" name="Marcador de fecha 2"/>
           <p:cNvSpPr>
             <a:spLocks noGrp="1"/>
           </p:cNvSpPr>
@@ -217,7 +219,7 @@
       </p:sp>
       <p:sp>
         <p:nvSpPr>
-          <p:cNvPr id="4" name="Marcador de imagen de diapositiva 3"/>
+          <p:cNvPr id="1003365056" name="Marcador de imagen de diapositiva 3"/>
           <p:cNvSpPr>
             <a:spLocks noChangeAspect="1" noGrp="1" noRot="1"/>
           </p:cNvSpPr>
@@ -253,7 +255,7 @@
       </p:sp>
       <p:sp>
         <p:nvSpPr>
-          <p:cNvPr id="5" name="Marcador de notas 4"/>
+          <p:cNvPr id="1201372046" name="Marcador de notas 4"/>
           <p:cNvSpPr>
             <a:spLocks noGrp="1"/>
           </p:cNvSpPr>
@@ -327,7 +329,7 @@
       </p:sp>
       <p:sp>
         <p:nvSpPr>
-          <p:cNvPr id="6" name="Marcador de pie de página 5"/>
+          <p:cNvPr id="2091401091" name="Marcador de pie de página 5"/>
           <p:cNvSpPr>
             <a:spLocks noGrp="1"/>
           </p:cNvSpPr>
@@ -361,7 +363,7 @@
       </p:sp>
       <p:sp>
         <p:nvSpPr>
-          <p:cNvPr id="7" name="Marcador de número de diapositiva 6"/>
+          <p:cNvPr id="569732282" name="Marcador de número de diapositiva 6"/>
           <p:cNvSpPr>
             <a:spLocks noGrp="1"/>
           </p:cNvSpPr>
@@ -514,7 +516,7 @@
       </p:grpSpPr>
       <p:sp>
         <p:nvSpPr>
-          <p:cNvPr id="2" name="Marcador de imagen de diapositiva 1"/>
+          <p:cNvPr id="526399927" name="Marcador de imagen de diapositiva 1"/>
           <p:cNvSpPr>
             <a:spLocks noChangeAspect="1" noGrp="1" noRot="1"/>
           </p:cNvSpPr>
@@ -531,7 +533,7 @@
       </p:sp>
       <p:sp>
         <p:nvSpPr>
-          <p:cNvPr id="3" name="Marcador de notas 4"/>
+          <p:cNvPr id="560355080" name="Marcador de notas 4"/>
           <p:cNvSpPr>
             <a:spLocks noGrp="1"/>
           </p:cNvSpPr>
@@ -556,7 +558,7 @@
       </p:sp>
       <p:sp>
         <p:nvSpPr>
-          <p:cNvPr id="4" name="Marcador de número de diapositiva 3"/>
+          <p:cNvPr id="1109961607" name="Marcador de número de diapositiva 3"/>
           <p:cNvSpPr>
             <a:spLocks noGrp="1"/>
           </p:cNvSpPr>
@@ -604,7 +606,7 @@
       </p:grpSpPr>
       <p:sp>
         <p:nvSpPr>
-          <p:cNvPr id="2" name="Slide Image Placeholder 1"/>
+          <p:cNvPr id="1908656265" name="Slide Image Placeholder 1"/>
           <p:cNvSpPr>
             <a:spLocks noChangeAspect="1" noGrp="1" noRot="1"/>
           </p:cNvSpPr>
@@ -616,7 +618,7 @@
       </p:sp>
       <p:sp>
         <p:nvSpPr>
-          <p:cNvPr id="3" name="Notes Placeholder 2"/>
+          <p:cNvPr id="1488133978" name="Notes Placeholder 2"/>
           <p:cNvSpPr>
             <a:spLocks noGrp="1"/>
           </p:cNvSpPr>
@@ -638,7 +640,7 @@
       </p:sp>
       <p:sp>
         <p:nvSpPr>
-          <p:cNvPr id="4" name="Slide Number Placeholder 3"/>
+          <p:cNvPr id="389827824" name="Slide Number Placeholder 3"/>
           <p:cNvSpPr>
             <a:spLocks noGrp="1"/>
           </p:cNvSpPr>
@@ -686,7 +688,7 @@
       </p:grpSpPr>
       <p:sp>
         <p:nvSpPr>
-          <p:cNvPr id="2" name="Slide Image Placeholder 1"/>
+          <p:cNvPr id="1925093807" name="Slide Image Placeholder 1"/>
           <p:cNvSpPr>
             <a:spLocks noChangeAspect="1" noGrp="1" noRot="1"/>
           </p:cNvSpPr>
@@ -698,7 +700,7 @@
       </p:sp>
       <p:sp>
         <p:nvSpPr>
-          <p:cNvPr id="3" name="Notes Placeholder 2"/>
+          <p:cNvPr id="868592749" name="Notes Placeholder 2"/>
           <p:cNvSpPr>
             <a:spLocks noGrp="1"/>
           </p:cNvSpPr>
@@ -720,7 +722,7 @@
       </p:sp>
       <p:sp>
         <p:nvSpPr>
-          <p:cNvPr id="4" name="Slide Number Placeholder 3"/>
+          <p:cNvPr id="55411638" name="Slide Number Placeholder 3"/>
           <p:cNvSpPr>
             <a:spLocks noGrp="1"/>
           </p:cNvSpPr>
@@ -768,6 +770,88 @@
       </p:grpSpPr>
       <p:sp>
         <p:nvSpPr>
+          <p:cNvPr id="303294975" name="Slide Image Placeholder 1"/>
+          <p:cNvSpPr>
+            <a:spLocks noChangeAspect="1" noGrp="1" noRot="1"/>
+          </p:cNvSpPr>
+          <p:nvPr>
+            <p:ph type="sldImg"/>
+          </p:nvPr>
+        </p:nvSpPr>
+        <p:spPr bwMode="auto"/>
+      </p:sp>
+      <p:sp>
+        <p:nvSpPr>
+          <p:cNvPr id="1744933046" name="Notes Placeholder 2"/>
+          <p:cNvSpPr>
+            <a:spLocks noGrp="1"/>
+          </p:cNvSpPr>
+          <p:nvPr>
+            <p:ph type="body" idx="1"/>
+          </p:nvPr>
+        </p:nvSpPr>
+        <p:spPr bwMode="auto"/>
+        <p:txBody>
+          <a:bodyPr/>
+          <a:lstStyle/>
+          <a:p>
+            <a:pPr>
+              <a:defRPr/>
+            </a:pPr>
+            <a:endParaRPr/>
+          </a:p>
+        </p:txBody>
+      </p:sp>
+      <p:sp>
+        <p:nvSpPr>
+          <p:cNvPr id="979684719" name="Slide Number Placeholder 3"/>
+          <p:cNvSpPr>
+            <a:spLocks noGrp="1"/>
+          </p:cNvSpPr>
+          <p:nvPr>
+            <p:ph type="sldNum" sz="quarter" idx="10"/>
+          </p:nvPr>
+        </p:nvSpPr>
+        <p:spPr bwMode="auto"/>
+        <p:txBody>
+          <a:bodyPr/>
+          <a:lstStyle/>
+          <a:p>
+            <a:pPr>
+              <a:defRPr/>
+            </a:pPr>
+            <a:fld id="{1EF31FD8-CB2F-4FC8-D67C-AA883F6A2607}" type="slidenum">
+              <a:rPr/>
+              <a:t/>
+            </a:fld>
+            <a:endParaRPr/>
+          </a:p>
+        </p:txBody>
+      </p:sp>
+    </p:spTree>
+  </p:cSld>
+</p:notes>
+</file>
+
+<file path=ppt/notesSlides/notesSlide13.xml><?xml version="1.0" encoding="utf-8"?>
+<p:notes xmlns:a="http://schemas.openxmlformats.org/drawingml/2006/main" xmlns:r="http://schemas.openxmlformats.org/officeDocument/2006/relationships" xmlns:p="http://schemas.openxmlformats.org/presentationml/2006/main" xmlns:m="http://schemas.openxmlformats.org/officeDocument/2006/math" xmlns:w="http://schemas.openxmlformats.org/wordprocessingml/2006/main">
+  <p:cSld name="">
+    <p:spTree>
+      <p:nvGrpSpPr>
+        <p:cNvPr id="1" name=""/>
+        <p:cNvGrpSpPr/>
+        <p:nvPr/>
+      </p:nvGrpSpPr>
+      <p:grpSpPr bwMode="auto">
+        <a:xfrm>
+          <a:off x="0" y="0"/>
+          <a:ext cx="0" cy="0"/>
+          <a:chOff x="0" y="0"/>
+          <a:chExt cx="0" cy="0"/>
+        </a:xfrm>
+      </p:grpSpPr>
+      <p:sp>
+        <p:nvSpPr>
           <p:cNvPr id="2" name="Slide Image Placeholder 1"/>
           <p:cNvSpPr>
             <a:spLocks noChangeAspect="1" noGrp="1" noRot="1"/>
@@ -818,7 +902,89 @@
             <a:pPr>
               <a:defRPr/>
             </a:pPr>
-            <a:fld id="{1EF31FD8-CB2F-4FC8-D67C-AA883F6A2607}" type="slidenum">
+            <a:fld id="{6741B3DB-8C2F-4DCE-1570-0EC95C7551E4}" type="slidenum">
+              <a:rPr/>
+              <a:t/>
+            </a:fld>
+            <a:endParaRPr/>
+          </a:p>
+        </p:txBody>
+      </p:sp>
+    </p:spTree>
+  </p:cSld>
+</p:notes>
+</file>
+
+<file path=ppt/notesSlides/notesSlide14.xml><?xml version="1.0" encoding="utf-8"?>
+<p:notes xmlns:a="http://schemas.openxmlformats.org/drawingml/2006/main" xmlns:r="http://schemas.openxmlformats.org/officeDocument/2006/relationships" xmlns:p="http://schemas.openxmlformats.org/presentationml/2006/main" xmlns:m="http://schemas.openxmlformats.org/officeDocument/2006/math" xmlns:w="http://schemas.openxmlformats.org/wordprocessingml/2006/main">
+  <p:cSld name="">
+    <p:spTree>
+      <p:nvGrpSpPr>
+        <p:cNvPr id="1" name=""/>
+        <p:cNvGrpSpPr/>
+        <p:nvPr/>
+      </p:nvGrpSpPr>
+      <p:grpSpPr bwMode="auto">
+        <a:xfrm>
+          <a:off x="0" y="0"/>
+          <a:ext cx="0" cy="0"/>
+          <a:chOff x="0" y="0"/>
+          <a:chExt cx="0" cy="0"/>
+        </a:xfrm>
+      </p:grpSpPr>
+      <p:sp>
+        <p:nvSpPr>
+          <p:cNvPr id="2" name="Slide Image Placeholder 1"/>
+          <p:cNvSpPr>
+            <a:spLocks noChangeAspect="1" noGrp="1" noRot="1"/>
+          </p:cNvSpPr>
+          <p:nvPr>
+            <p:ph type="sldImg"/>
+          </p:nvPr>
+        </p:nvSpPr>
+        <p:spPr bwMode="auto"/>
+      </p:sp>
+      <p:sp>
+        <p:nvSpPr>
+          <p:cNvPr id="3" name="Notes Placeholder 2"/>
+          <p:cNvSpPr>
+            <a:spLocks noGrp="1"/>
+          </p:cNvSpPr>
+          <p:nvPr>
+            <p:ph type="body" idx="1"/>
+          </p:nvPr>
+        </p:nvSpPr>
+        <p:spPr bwMode="auto"/>
+        <p:txBody>
+          <a:bodyPr/>
+          <a:lstStyle/>
+          <a:p>
+            <a:pPr>
+              <a:defRPr/>
+            </a:pPr>
+            <a:endParaRPr/>
+          </a:p>
+        </p:txBody>
+      </p:sp>
+      <p:sp>
+        <p:nvSpPr>
+          <p:cNvPr id="4" name="Slide Number Placeholder 3"/>
+          <p:cNvSpPr>
+            <a:spLocks noGrp="1"/>
+          </p:cNvSpPr>
+          <p:nvPr>
+            <p:ph type="sldNum" sz="quarter" idx="10"/>
+          </p:nvPr>
+        </p:nvSpPr>
+        <p:spPr bwMode="auto"/>
+        <p:txBody>
+          <a:bodyPr/>
+          <a:lstStyle/>
+          <a:p>
+            <a:pPr>
+              <a:defRPr/>
+            </a:pPr>
+            <a:fld id="{94031BB8-F6A0-16A7-0056-0483EE79FB89}" type="slidenum">
               <a:rPr/>
               <a:t/>
             </a:fld>
@@ -850,7 +1016,7 @@
       </p:grpSpPr>
       <p:sp>
         <p:nvSpPr>
-          <p:cNvPr id="2" name="Slide Image Placeholder 1"/>
+          <p:cNvPr id="1125614516" name="Slide Image Placeholder 1"/>
           <p:cNvSpPr>
             <a:spLocks noChangeAspect="1" noGrp="1" noRot="1"/>
           </p:cNvSpPr>
@@ -862,7 +1028,7 @@
       </p:sp>
       <p:sp>
         <p:nvSpPr>
-          <p:cNvPr id="3" name="Notes Placeholder 2"/>
+          <p:cNvPr id="1988636352" name="Notes Placeholder 2"/>
           <p:cNvSpPr>
             <a:spLocks noGrp="1"/>
           </p:cNvSpPr>
@@ -884,7 +1050,7 @@
       </p:sp>
       <p:sp>
         <p:nvSpPr>
-          <p:cNvPr id="4" name="Slide Number Placeholder 3"/>
+          <p:cNvPr id="511390668" name="Slide Number Placeholder 3"/>
           <p:cNvSpPr>
             <a:spLocks noGrp="1"/>
           </p:cNvSpPr>
@@ -932,7 +1098,7 @@
       </p:grpSpPr>
       <p:sp>
         <p:nvSpPr>
-          <p:cNvPr id="2" name="Slide Image Placeholder 1"/>
+          <p:cNvPr id="1539116788" name="Slide Image Placeholder 1"/>
           <p:cNvSpPr>
             <a:spLocks noChangeAspect="1" noGrp="1" noRot="1"/>
           </p:cNvSpPr>
@@ -944,7 +1110,7 @@
       </p:sp>
       <p:sp>
         <p:nvSpPr>
-          <p:cNvPr id="3" name="Notes Placeholder 2"/>
+          <p:cNvPr id="331694251" name="Notes Placeholder 2"/>
           <p:cNvSpPr>
             <a:spLocks noGrp="1"/>
           </p:cNvSpPr>
@@ -966,7 +1132,7 @@
       </p:sp>
       <p:sp>
         <p:nvSpPr>
-          <p:cNvPr id="4" name="Slide Number Placeholder 3"/>
+          <p:cNvPr id="633969073" name="Slide Number Placeholder 3"/>
           <p:cNvSpPr>
             <a:spLocks noGrp="1"/>
           </p:cNvSpPr>
@@ -1014,7 +1180,7 @@
       </p:grpSpPr>
       <p:sp>
         <p:nvSpPr>
-          <p:cNvPr id="2" name="Slide Image Placeholder 1"/>
+          <p:cNvPr id="1743152562" name="Slide Image Placeholder 1"/>
           <p:cNvSpPr>
             <a:spLocks noChangeAspect="1" noGrp="1" noRot="1"/>
           </p:cNvSpPr>
@@ -1026,7 +1192,7 @@
       </p:sp>
       <p:sp>
         <p:nvSpPr>
-          <p:cNvPr id="3" name="Notes Placeholder 2"/>
+          <p:cNvPr id="735635936" name="Notes Placeholder 2"/>
           <p:cNvSpPr>
             <a:spLocks noGrp="1"/>
           </p:cNvSpPr>
@@ -1052,7 +1218,7 @@
       </p:sp>
       <p:sp>
         <p:nvSpPr>
-          <p:cNvPr id="4" name="Slide Number Placeholder 3"/>
+          <p:cNvPr id="1506831278" name="Slide Number Placeholder 3"/>
           <p:cNvSpPr>
             <a:spLocks noGrp="1"/>
           </p:cNvSpPr>
@@ -1100,7 +1266,7 @@
       </p:grpSpPr>
       <p:sp>
         <p:nvSpPr>
-          <p:cNvPr id="2" name="Slide Image Placeholder 1"/>
+          <p:cNvPr id="318277800" name="Slide Image Placeholder 1"/>
           <p:cNvSpPr>
             <a:spLocks noChangeAspect="1" noGrp="1" noRot="1"/>
           </p:cNvSpPr>
@@ -1112,7 +1278,7 @@
       </p:sp>
       <p:sp>
         <p:nvSpPr>
-          <p:cNvPr id="3" name="Notes Placeholder 2"/>
+          <p:cNvPr id="1440170331" name="Notes Placeholder 2"/>
           <p:cNvSpPr>
             <a:spLocks noGrp="1"/>
           </p:cNvSpPr>
@@ -1145,7 +1311,7 @@
       </p:sp>
       <p:sp>
         <p:nvSpPr>
-          <p:cNvPr id="4" name="Slide Number Placeholder 3"/>
+          <p:cNvPr id="1344846505" name="Slide Number Placeholder 3"/>
           <p:cNvSpPr>
             <a:spLocks noGrp="1"/>
           </p:cNvSpPr>
@@ -1193,7 +1359,7 @@
       </p:grpSpPr>
       <p:sp>
         <p:nvSpPr>
-          <p:cNvPr id="2" name="Slide Image Placeholder 1"/>
+          <p:cNvPr id="1712103817" name="Slide Image Placeholder 1"/>
           <p:cNvSpPr>
             <a:spLocks noChangeAspect="1" noGrp="1" noRot="1"/>
           </p:cNvSpPr>
@@ -1205,7 +1371,7 @@
       </p:sp>
       <p:sp>
         <p:nvSpPr>
-          <p:cNvPr id="3" name="Notes Placeholder 2"/>
+          <p:cNvPr id="2073484376" name="Notes Placeholder 2"/>
           <p:cNvSpPr>
             <a:spLocks noGrp="1"/>
           </p:cNvSpPr>
@@ -1227,7 +1393,7 @@
       </p:sp>
       <p:sp>
         <p:nvSpPr>
-          <p:cNvPr id="4" name="Slide Number Placeholder 3"/>
+          <p:cNvPr id="1084564052" name="Slide Number Placeholder 3"/>
           <p:cNvSpPr>
             <a:spLocks noGrp="1"/>
           </p:cNvSpPr>
@@ -1275,7 +1441,7 @@
       </p:grpSpPr>
       <p:sp>
         <p:nvSpPr>
-          <p:cNvPr id="2" name="Slide Image Placeholder 1"/>
+          <p:cNvPr id="215492711" name="Slide Image Placeholder 1"/>
           <p:cNvSpPr>
             <a:spLocks noChangeAspect="1" noGrp="1" noRot="1"/>
           </p:cNvSpPr>
@@ -1287,7 +1453,7 @@
       </p:sp>
       <p:sp>
         <p:nvSpPr>
-          <p:cNvPr id="3" name="Notes Placeholder 2"/>
+          <p:cNvPr id="1970120268" name="Notes Placeholder 2"/>
           <p:cNvSpPr>
             <a:spLocks noGrp="1"/>
           </p:cNvSpPr>
@@ -1309,7 +1475,7 @@
       </p:sp>
       <p:sp>
         <p:nvSpPr>
-          <p:cNvPr id="4" name="Slide Number Placeholder 3"/>
+          <p:cNvPr id="491929003" name="Slide Number Placeholder 3"/>
           <p:cNvSpPr>
             <a:spLocks noGrp="1"/>
           </p:cNvSpPr>
@@ -1357,7 +1523,7 @@
       </p:grpSpPr>
       <p:sp>
         <p:nvSpPr>
-          <p:cNvPr id="2" name="Slide Image Placeholder 1"/>
+          <p:cNvPr id="275151327" name="Slide Image Placeholder 1"/>
           <p:cNvSpPr>
             <a:spLocks noChangeAspect="1" noGrp="1" noRot="1"/>
           </p:cNvSpPr>
@@ -1369,7 +1535,7 @@
       </p:sp>
       <p:sp>
         <p:nvSpPr>
-          <p:cNvPr id="3" name="Notes Placeholder 2"/>
+          <p:cNvPr id="1402047380" name="Notes Placeholder 2"/>
           <p:cNvSpPr>
             <a:spLocks noGrp="1"/>
           </p:cNvSpPr>
@@ -1391,7 +1557,7 @@
       </p:sp>
       <p:sp>
         <p:nvSpPr>
-          <p:cNvPr id="4" name="Slide Number Placeholder 3"/>
+          <p:cNvPr id="874058742" name="Slide Number Placeholder 3"/>
           <p:cNvSpPr>
             <a:spLocks noGrp="1"/>
           </p:cNvSpPr>
@@ -1439,7 +1605,7 @@
       </p:grpSpPr>
       <p:sp>
         <p:nvSpPr>
-          <p:cNvPr id="2" name="Slide Image Placeholder 1"/>
+          <p:cNvPr id="812459085" name="Slide Image Placeholder 1"/>
           <p:cNvSpPr>
             <a:spLocks noChangeAspect="1" noGrp="1" noRot="1"/>
           </p:cNvSpPr>
@@ -1451,7 +1617,7 @@
       </p:sp>
       <p:sp>
         <p:nvSpPr>
-          <p:cNvPr id="3" name="Notes Placeholder 2"/>
+          <p:cNvPr id="2076239843" name="Notes Placeholder 2"/>
           <p:cNvSpPr>
             <a:spLocks noGrp="1"/>
           </p:cNvSpPr>
@@ -1473,7 +1639,7 @@
       </p:sp>
       <p:sp>
         <p:nvSpPr>
-          <p:cNvPr id="4" name="Slide Number Placeholder 3"/>
+          <p:cNvPr id="2038773948" name="Slide Number Placeholder 3"/>
           <p:cNvSpPr>
             <a:spLocks noGrp="1"/>
           </p:cNvSpPr>
@@ -1521,7 +1687,7 @@
       </p:grpSpPr>
       <p:sp>
         <p:nvSpPr>
-          <p:cNvPr id="2" name="Title 1"/>
+          <p:cNvPr id="10243407" name="Title 1"/>
           <p:cNvSpPr>
             <a:spLocks noGrp="1"/>
           </p:cNvSpPr>
@@ -1552,7 +1718,7 @@
       </p:sp>
       <p:sp>
         <p:nvSpPr>
-          <p:cNvPr id="3" name="Subtitle 2"/>
+          <p:cNvPr id="1347784056" name="Subtitle 2"/>
           <p:cNvSpPr>
             <a:spLocks noGrp="1"/>
           </p:cNvSpPr>
@@ -1675,7 +1841,7 @@
       </p:sp>
       <p:sp>
         <p:nvSpPr>
-          <p:cNvPr id="4" name="Date Placeholder 3"/>
+          <p:cNvPr id="412894957" name="Date Placeholder 3"/>
           <p:cNvSpPr>
             <a:spLocks noGrp="1"/>
           </p:cNvSpPr>
@@ -1701,7 +1867,7 @@
       </p:sp>
       <p:sp>
         <p:nvSpPr>
-          <p:cNvPr id="5" name="Footer Placeholder 4"/>
+          <p:cNvPr id="567524488" name="Footer Placeholder 4"/>
           <p:cNvSpPr>
             <a:spLocks noGrp="1"/>
           </p:cNvSpPr>
@@ -1723,7 +1889,7 @@
       </p:sp>
       <p:sp>
         <p:nvSpPr>
-          <p:cNvPr id="6" name="Slide Number Placeholder 5"/>
+          <p:cNvPr id="1764141438" name="Slide Number Placeholder 5"/>
           <p:cNvSpPr>
             <a:spLocks noGrp="1"/>
           </p:cNvSpPr>
@@ -1774,7 +1940,7 @@
       </p:grpSpPr>
       <p:sp>
         <p:nvSpPr>
-          <p:cNvPr id="2" name="Title 1"/>
+          <p:cNvPr id="923948875" name="Title 1"/>
           <p:cNvSpPr>
             <a:spLocks noGrp="1"/>
           </p:cNvSpPr>
@@ -1800,7 +1966,7 @@
       </p:sp>
       <p:sp>
         <p:nvSpPr>
-          <p:cNvPr id="3" name="Vertical Text Placeholder 2"/>
+          <p:cNvPr id="1364859689" name="Vertical Text Placeholder 2"/>
           <p:cNvSpPr>
             <a:spLocks noGrp="1"/>
           </p:cNvSpPr>
@@ -1866,7 +2032,7 @@
       </p:sp>
       <p:sp>
         <p:nvSpPr>
-          <p:cNvPr id="4" name="Date Placeholder 3"/>
+          <p:cNvPr id="1687661650" name="Date Placeholder 3"/>
           <p:cNvSpPr>
             <a:spLocks noGrp="1"/>
           </p:cNvSpPr>
@@ -1892,7 +2058,7 @@
       </p:sp>
       <p:sp>
         <p:nvSpPr>
-          <p:cNvPr id="5" name="Footer Placeholder 4"/>
+          <p:cNvPr id="1017942894" name="Footer Placeholder 4"/>
           <p:cNvSpPr>
             <a:spLocks noGrp="1"/>
           </p:cNvSpPr>
@@ -1914,7 +2080,7 @@
       </p:sp>
       <p:sp>
         <p:nvSpPr>
-          <p:cNvPr id="6" name="Slide Number Placeholder 5"/>
+          <p:cNvPr id="519520736" name="Slide Number Placeholder 5"/>
           <p:cNvSpPr>
             <a:spLocks noGrp="1"/>
           </p:cNvSpPr>
@@ -1965,7 +2131,7 @@
       </p:grpSpPr>
       <p:sp>
         <p:nvSpPr>
-          <p:cNvPr id="2" name="Vertical Title 1"/>
+          <p:cNvPr id="1653077674" name="Vertical Title 1"/>
           <p:cNvSpPr>
             <a:spLocks noGrp="1"/>
           </p:cNvSpPr>
@@ -2000,7 +2166,7 @@
       </p:sp>
       <p:sp>
         <p:nvSpPr>
-          <p:cNvPr id="3" name="Vertical Text Placeholder 2"/>
+          <p:cNvPr id="1043232553" name="Vertical Text Placeholder 2"/>
           <p:cNvSpPr>
             <a:spLocks noGrp="1"/>
           </p:cNvSpPr>
@@ -2071,7 +2237,7 @@
       </p:sp>
       <p:sp>
         <p:nvSpPr>
-          <p:cNvPr id="4" name="Date Placeholder 3"/>
+          <p:cNvPr id="1891466703" name="Date Placeholder 3"/>
           <p:cNvSpPr>
             <a:spLocks noGrp="1"/>
           </p:cNvSpPr>
@@ -2097,7 +2263,7 @@
       </p:sp>
       <p:sp>
         <p:nvSpPr>
-          <p:cNvPr id="5" name="Footer Placeholder 4"/>
+          <p:cNvPr id="1436921333" name="Footer Placeholder 4"/>
           <p:cNvSpPr>
             <a:spLocks noGrp="1"/>
           </p:cNvSpPr>
@@ -2119,7 +2285,7 @@
       </p:sp>
       <p:sp>
         <p:nvSpPr>
-          <p:cNvPr id="6" name="Slide Number Placeholder 5"/>
+          <p:cNvPr id="1545726869" name="Slide Number Placeholder 5"/>
           <p:cNvSpPr>
             <a:spLocks noGrp="1"/>
           </p:cNvSpPr>
@@ -2170,7 +2336,7 @@
       </p:grpSpPr>
       <p:sp>
         <p:nvSpPr>
-          <p:cNvPr id="2" name="Title 1"/>
+          <p:cNvPr id="1952939323" name="Title 1"/>
           <p:cNvSpPr>
             <a:spLocks noGrp="1"/>
           </p:cNvSpPr>
@@ -2196,7 +2362,7 @@
       </p:sp>
       <p:sp>
         <p:nvSpPr>
-          <p:cNvPr id="3" name="Content Placeholder 2"/>
+          <p:cNvPr id="1644715793" name="Content Placeholder 2"/>
           <p:cNvSpPr>
             <a:spLocks noGrp="1"/>
           </p:cNvSpPr>
@@ -2262,7 +2428,7 @@
       </p:sp>
       <p:sp>
         <p:nvSpPr>
-          <p:cNvPr id="4" name="Date Placeholder 3"/>
+          <p:cNvPr id="893279759" name="Date Placeholder 3"/>
           <p:cNvSpPr>
             <a:spLocks noGrp="1"/>
           </p:cNvSpPr>
@@ -2288,7 +2454,7 @@
       </p:sp>
       <p:sp>
         <p:nvSpPr>
-          <p:cNvPr id="5" name="Footer Placeholder 4"/>
+          <p:cNvPr id="994825835" name="Footer Placeholder 4"/>
           <p:cNvSpPr>
             <a:spLocks noGrp="1"/>
           </p:cNvSpPr>
@@ -2310,7 +2476,7 @@
       </p:sp>
       <p:sp>
         <p:nvSpPr>
-          <p:cNvPr id="6" name="Slide Number Placeholder 5"/>
+          <p:cNvPr id="15482321" name="Slide Number Placeholder 5"/>
           <p:cNvSpPr>
             <a:spLocks noGrp="1"/>
           </p:cNvSpPr>
@@ -2361,7 +2527,7 @@
       </p:grpSpPr>
       <p:sp>
         <p:nvSpPr>
-          <p:cNvPr id="2" name="Title 1"/>
+          <p:cNvPr id="1786921554" name="Title 1"/>
           <p:cNvSpPr>
             <a:spLocks noGrp="1"/>
           </p:cNvSpPr>
@@ -2396,7 +2562,7 @@
       </p:sp>
       <p:sp>
         <p:nvSpPr>
-          <p:cNvPr id="3" name="Text Placeholder 2"/>
+          <p:cNvPr id="1616405815" name="Text Placeholder 2"/>
           <p:cNvSpPr>
             <a:spLocks noGrp="1"/>
           </p:cNvSpPr>
@@ -2518,7 +2684,7 @@
       </p:sp>
       <p:sp>
         <p:nvSpPr>
-          <p:cNvPr id="4" name="Date Placeholder 3"/>
+          <p:cNvPr id="1476487464" name="Date Placeholder 3"/>
           <p:cNvSpPr>
             <a:spLocks noGrp="1"/>
           </p:cNvSpPr>
@@ -2544,7 +2710,7 @@
       </p:sp>
       <p:sp>
         <p:nvSpPr>
-          <p:cNvPr id="5" name="Footer Placeholder 4"/>
+          <p:cNvPr id="1536953930" name="Footer Placeholder 4"/>
           <p:cNvSpPr>
             <a:spLocks noGrp="1"/>
           </p:cNvSpPr>
@@ -2566,7 +2732,7 @@
       </p:sp>
       <p:sp>
         <p:nvSpPr>
-          <p:cNvPr id="6" name="Slide Number Placeholder 5"/>
+          <p:cNvPr id="1872846575" name="Slide Number Placeholder 5"/>
           <p:cNvSpPr>
             <a:spLocks noGrp="1"/>
           </p:cNvSpPr>
@@ -2617,7 +2783,7 @@
       </p:grpSpPr>
       <p:sp>
         <p:nvSpPr>
-          <p:cNvPr id="2" name="Title 1"/>
+          <p:cNvPr id="1709954363" name="Title 1"/>
           <p:cNvSpPr>
             <a:spLocks noGrp="1"/>
           </p:cNvSpPr>
@@ -2643,7 +2809,7 @@
       </p:sp>
       <p:sp>
         <p:nvSpPr>
-          <p:cNvPr id="3" name="Content Placeholder 2"/>
+          <p:cNvPr id="184849436" name="Content Placeholder 2"/>
           <p:cNvSpPr>
             <a:spLocks noGrp="1"/>
           </p:cNvSpPr>
@@ -2742,7 +2908,7 @@
       </p:sp>
       <p:sp>
         <p:nvSpPr>
-          <p:cNvPr id="4" name="Content Placeholder 3"/>
+          <p:cNvPr id="1748722394" name="Content Placeholder 3"/>
           <p:cNvSpPr>
             <a:spLocks noGrp="1"/>
           </p:cNvSpPr>
@@ -2841,7 +3007,7 @@
       </p:sp>
       <p:sp>
         <p:nvSpPr>
-          <p:cNvPr id="5" name="Date Placeholder 4"/>
+          <p:cNvPr id="2053041016" name="Date Placeholder 4"/>
           <p:cNvSpPr>
             <a:spLocks noGrp="1"/>
           </p:cNvSpPr>
@@ -2867,7 +3033,7 @@
       </p:sp>
       <p:sp>
         <p:nvSpPr>
-          <p:cNvPr id="6" name="Footer Placeholder 5"/>
+          <p:cNvPr id="997899760" name="Footer Placeholder 5"/>
           <p:cNvSpPr>
             <a:spLocks noGrp="1"/>
           </p:cNvSpPr>
@@ -2889,7 +3055,7 @@
       </p:sp>
       <p:sp>
         <p:nvSpPr>
-          <p:cNvPr id="7" name="Slide Number Placeholder 6"/>
+          <p:cNvPr id="1779672230" name="Slide Number Placeholder 6"/>
           <p:cNvSpPr>
             <a:spLocks noGrp="1"/>
           </p:cNvSpPr>
@@ -2940,7 +3106,7 @@
       </p:grpSpPr>
       <p:sp>
         <p:nvSpPr>
-          <p:cNvPr id="2" name="Title 1"/>
+          <p:cNvPr id="1164964888" name="Title 1"/>
           <p:cNvSpPr>
             <a:spLocks noGrp="1"/>
           </p:cNvSpPr>
@@ -2970,7 +3136,7 @@
       </p:sp>
       <p:sp>
         <p:nvSpPr>
-          <p:cNvPr id="3" name="Text Placeholder 2"/>
+          <p:cNvPr id="91023228" name="Text Placeholder 2"/>
           <p:cNvSpPr>
             <a:spLocks noGrp="1"/>
           </p:cNvSpPr>
@@ -3038,7 +3204,7 @@
       </p:sp>
       <p:sp>
         <p:nvSpPr>
-          <p:cNvPr id="4" name="Content Placeholder 3"/>
+          <p:cNvPr id="1123887499" name="Content Placeholder 3"/>
           <p:cNvSpPr>
             <a:spLocks noGrp="1"/>
           </p:cNvSpPr>
@@ -3137,7 +3303,7 @@
       </p:sp>
       <p:sp>
         <p:nvSpPr>
-          <p:cNvPr id="5" name="Text Placeholder 4"/>
+          <p:cNvPr id="1305476364" name="Text Placeholder 4"/>
           <p:cNvSpPr>
             <a:spLocks noGrp="1"/>
           </p:cNvSpPr>
@@ -3205,7 +3371,7 @@
       </p:sp>
       <p:sp>
         <p:nvSpPr>
-          <p:cNvPr id="6" name="Content Placeholder 5"/>
+          <p:cNvPr id="1312675144" name="Content Placeholder 5"/>
           <p:cNvSpPr>
             <a:spLocks noGrp="1"/>
           </p:cNvSpPr>
@@ -3304,7 +3470,7 @@
       </p:sp>
       <p:sp>
         <p:nvSpPr>
-          <p:cNvPr id="7" name="Date Placeholder 6"/>
+          <p:cNvPr id="1992859618" name="Date Placeholder 6"/>
           <p:cNvSpPr>
             <a:spLocks noGrp="1"/>
           </p:cNvSpPr>
@@ -3330,7 +3496,7 @@
       </p:sp>
       <p:sp>
         <p:nvSpPr>
-          <p:cNvPr id="8" name="Footer Placeholder 7"/>
+          <p:cNvPr id="677174330" name="Footer Placeholder 7"/>
           <p:cNvSpPr>
             <a:spLocks noGrp="1"/>
           </p:cNvSpPr>
@@ -3352,7 +3518,7 @@
       </p:sp>
       <p:sp>
         <p:nvSpPr>
-          <p:cNvPr id="9" name="Slide Number Placeholder 8"/>
+          <p:cNvPr id="961357026" name="Slide Number Placeholder 8"/>
           <p:cNvSpPr>
             <a:spLocks noGrp="1"/>
           </p:cNvSpPr>
@@ -3403,7 +3569,7 @@
       </p:grpSpPr>
       <p:sp>
         <p:nvSpPr>
-          <p:cNvPr id="2" name="Title 1"/>
+          <p:cNvPr id="580634494" name="Title 1"/>
           <p:cNvSpPr>
             <a:spLocks noGrp="1"/>
           </p:cNvSpPr>
@@ -3429,7 +3595,7 @@
       </p:sp>
       <p:sp>
         <p:nvSpPr>
-          <p:cNvPr id="3" name="Date Placeholder 2"/>
+          <p:cNvPr id="1829287080" name="Date Placeholder 2"/>
           <p:cNvSpPr>
             <a:spLocks noGrp="1"/>
           </p:cNvSpPr>
@@ -3455,7 +3621,7 @@
       </p:sp>
       <p:sp>
         <p:nvSpPr>
-          <p:cNvPr id="4" name="Footer Placeholder 3"/>
+          <p:cNvPr id="747567958" name="Footer Placeholder 3"/>
           <p:cNvSpPr>
             <a:spLocks noGrp="1"/>
           </p:cNvSpPr>
@@ -3477,7 +3643,7 @@
       </p:sp>
       <p:sp>
         <p:nvSpPr>
-          <p:cNvPr id="5" name="Slide Number Placeholder 4"/>
+          <p:cNvPr id="1291231466" name="Slide Number Placeholder 4"/>
           <p:cNvSpPr>
             <a:spLocks noGrp="1"/>
           </p:cNvSpPr>
@@ -3528,7 +3694,7 @@
       </p:grpSpPr>
       <p:sp>
         <p:nvSpPr>
-          <p:cNvPr id="2" name="Date Placeholder 1"/>
+          <p:cNvPr id="796840289" name="Date Placeholder 1"/>
           <p:cNvSpPr>
             <a:spLocks noGrp="1"/>
           </p:cNvSpPr>
@@ -3554,7 +3720,7 @@
       </p:sp>
       <p:sp>
         <p:nvSpPr>
-          <p:cNvPr id="3" name="Footer Placeholder 2"/>
+          <p:cNvPr id="750567953" name="Footer Placeholder 2"/>
           <p:cNvSpPr>
             <a:spLocks noGrp="1"/>
           </p:cNvSpPr>
@@ -3576,7 +3742,7 @@
       </p:sp>
       <p:sp>
         <p:nvSpPr>
-          <p:cNvPr id="4" name="Slide Number Placeholder 3"/>
+          <p:cNvPr id="858386978" name="Slide Number Placeholder 3"/>
           <p:cNvSpPr>
             <a:spLocks noGrp="1"/>
           </p:cNvSpPr>
@@ -3627,7 +3793,7 @@
       </p:grpSpPr>
       <p:sp>
         <p:nvSpPr>
-          <p:cNvPr id="2" name="Title 1"/>
+          <p:cNvPr id="309068256" name="Title 1"/>
           <p:cNvSpPr>
             <a:spLocks noGrp="1"/>
           </p:cNvSpPr>
@@ -3662,7 +3828,7 @@
       </p:sp>
       <p:sp>
         <p:nvSpPr>
-          <p:cNvPr id="3" name="Content Placeholder 2"/>
+          <p:cNvPr id="1129149503" name="Content Placeholder 2"/>
           <p:cNvSpPr>
             <a:spLocks noGrp="1"/>
           </p:cNvSpPr>
@@ -3761,7 +3927,7 @@
       </p:sp>
       <p:sp>
         <p:nvSpPr>
-          <p:cNvPr id="4" name="Text Placeholder 3"/>
+          <p:cNvPr id="784006277" name="Text Placeholder 3"/>
           <p:cNvSpPr>
             <a:spLocks noGrp="1"/>
           </p:cNvSpPr>
@@ -3829,7 +3995,7 @@
       </p:sp>
       <p:sp>
         <p:nvSpPr>
-          <p:cNvPr id="5" name="Date Placeholder 4"/>
+          <p:cNvPr id="1276784737" name="Date Placeholder 4"/>
           <p:cNvSpPr>
             <a:spLocks noGrp="1"/>
           </p:cNvSpPr>
@@ -3855,7 +4021,7 @@
       </p:sp>
       <p:sp>
         <p:nvSpPr>
-          <p:cNvPr id="6" name="Footer Placeholder 5"/>
+          <p:cNvPr id="1119743905" name="Footer Placeholder 5"/>
           <p:cNvSpPr>
             <a:spLocks noGrp="1"/>
           </p:cNvSpPr>
@@ -3877,7 +4043,7 @@
       </p:sp>
       <p:sp>
         <p:nvSpPr>
-          <p:cNvPr id="7" name="Slide Number Placeholder 6"/>
+          <p:cNvPr id="141218172" name="Slide Number Placeholder 6"/>
           <p:cNvSpPr>
             <a:spLocks noGrp="1"/>
           </p:cNvSpPr>
@@ -3928,7 +4094,7 @@
       </p:grpSpPr>
       <p:sp>
         <p:nvSpPr>
-          <p:cNvPr id="2" name="Title 1"/>
+          <p:cNvPr id="1783441335" name="Title 1"/>
           <p:cNvSpPr>
             <a:spLocks noGrp="1"/>
           </p:cNvSpPr>
@@ -3963,7 +4129,7 @@
       </p:sp>
       <p:sp>
         <p:nvSpPr>
-          <p:cNvPr id="3" name="Picture Placeholder 2"/>
+          <p:cNvPr id="146870101" name="Picture Placeholder 2"/>
           <p:cNvSpPr>
             <a:spLocks noGrp="1"/>
           </p:cNvSpPr>
@@ -4027,7 +4193,7 @@
       </p:sp>
       <p:sp>
         <p:nvSpPr>
-          <p:cNvPr id="4" name="Text Placeholder 3"/>
+          <p:cNvPr id="315146010" name="Text Placeholder 3"/>
           <p:cNvSpPr>
             <a:spLocks noGrp="1"/>
           </p:cNvSpPr>
@@ -4095,7 +4261,7 @@
       </p:sp>
       <p:sp>
         <p:nvSpPr>
-          <p:cNvPr id="5" name="Date Placeholder 4"/>
+          <p:cNvPr id="2111394587" name="Date Placeholder 4"/>
           <p:cNvSpPr>
             <a:spLocks noGrp="1"/>
           </p:cNvSpPr>
@@ -4121,7 +4287,7 @@
       </p:sp>
       <p:sp>
         <p:nvSpPr>
-          <p:cNvPr id="6" name="Footer Placeholder 5"/>
+          <p:cNvPr id="2017822401" name="Footer Placeholder 5"/>
           <p:cNvSpPr>
             <a:spLocks noGrp="1"/>
           </p:cNvSpPr>
@@ -4143,7 +4309,7 @@
       </p:sp>
       <p:sp>
         <p:nvSpPr>
-          <p:cNvPr id="7" name="Slide Number Placeholder 6"/>
+          <p:cNvPr id="1156788851" name="Slide Number Placeholder 6"/>
           <p:cNvSpPr>
             <a:spLocks noGrp="1"/>
           </p:cNvSpPr>
@@ -4199,7 +4365,7 @@
       </p:grpSpPr>
       <p:sp>
         <p:nvSpPr>
-          <p:cNvPr id="7" name="Shape 1058"/>
+          <p:cNvPr id="1509167118" name="Shape 1058"/>
           <p:cNvSpPr>
             <a:spLocks noChangeArrowheads="1" noGrp="1"/>
           </p:cNvSpPr>
@@ -4257,7 +4423,7 @@
       </p:sp>
       <p:sp>
         <p:nvSpPr>
-          <p:cNvPr id="8" name="Shape 1059"/>
+          <p:cNvPr id="578894239" name="Shape 1059"/>
           <p:cNvSpPr>
             <a:spLocks noChangeArrowheads="1" noGrp="1"/>
           </p:cNvSpPr>
@@ -4305,7 +4471,7 @@
       </p:sp>
       <p:sp>
         <p:nvSpPr>
-          <p:cNvPr id="9" name="Shape 1060"/>
+          <p:cNvPr id="1269643058" name="Shape 1060"/>
           <p:cNvSpPr>
             <a:spLocks noChangeArrowheads="1" noGrp="1"/>
           </p:cNvSpPr>
@@ -4355,7 +4521,7 @@
       </p:sp>
       <p:sp>
         <p:nvSpPr>
-          <p:cNvPr id="10" name="Shape 1061"/>
+          <p:cNvPr id="219608550" name="Shape 1061"/>
           <p:cNvSpPr>
             <a:spLocks noChangeArrowheads="1" noGrp="1"/>
           </p:cNvSpPr>
@@ -4405,7 +4571,7 @@
       </p:sp>
       <p:sp>
         <p:nvSpPr>
-          <p:cNvPr id="11" name="Shape 1062"/>
+          <p:cNvPr id="1506910587" name="Shape 1062"/>
           <p:cNvSpPr>
             <a:spLocks noChangeArrowheads="1" noGrp="1"/>
           </p:cNvSpPr>
@@ -4455,7 +4621,7 @@
       </p:sp>
       <p:sp>
         <p:nvSpPr>
-          <p:cNvPr id="12" name="Shape 1063"/>
+          <p:cNvPr id="1592045722" name="Shape 1063"/>
           <p:cNvSpPr>
             <a:spLocks noChangeArrowheads="1" noGrp="1"/>
           </p:cNvSpPr>
@@ -4505,7 +4671,7 @@
       </p:sp>
       <p:sp>
         <p:nvSpPr>
-          <p:cNvPr id="13" name="Shape 1064"/>
+          <p:cNvPr id="32767714" name="Shape 1064"/>
           <p:cNvSpPr>
             <a:spLocks noChangeArrowheads="1" noGrp="1"/>
           </p:cNvSpPr>
@@ -4555,7 +4721,7 @@
       </p:sp>
       <p:sp>
         <p:nvSpPr>
-          <p:cNvPr id="14" name="Shape 1065"/>
+          <p:cNvPr id="551874116" name="Shape 1065"/>
           <p:cNvSpPr>
             <a:spLocks noChangeArrowheads="1" noGrp="1"/>
           </p:cNvSpPr>
@@ -4605,7 +4771,7 @@
       </p:sp>
       <p:sp>
         <p:nvSpPr>
-          <p:cNvPr id="15" name="Shape 1066"/>
+          <p:cNvPr id="176806814" name="Shape 1066"/>
           <p:cNvSpPr>
             <a:spLocks noChangeArrowheads="1" noGrp="1"/>
           </p:cNvSpPr>
@@ -4655,7 +4821,7 @@
       </p:sp>
       <p:sp>
         <p:nvSpPr>
-          <p:cNvPr id="16" name="Shape 1067"/>
+          <p:cNvPr id="1699576319" name="Shape 1067"/>
           <p:cNvSpPr>
             <a:spLocks noChangeArrowheads="1" noGrp="1"/>
           </p:cNvSpPr>
@@ -4705,7 +4871,7 @@
       </p:sp>
       <p:sp>
         <p:nvSpPr>
-          <p:cNvPr id="3" name="Text Placeholder 2"/>
+          <p:cNvPr id="1876005479" name="Text Placeholder 2"/>
           <p:cNvSpPr>
             <a:spLocks noGrp="1"/>
           </p:cNvSpPr>
@@ -4781,7 +4947,7 @@
       </p:sp>
       <p:sp>
         <p:nvSpPr>
-          <p:cNvPr id="4" name="Date Placeholder 3"/>
+          <p:cNvPr id="1785319474" name="Date Placeholder 3"/>
           <p:cNvSpPr>
             <a:spLocks noGrp="1"/>
           </p:cNvSpPr>
@@ -4825,7 +4991,7 @@
       </p:sp>
       <p:sp>
         <p:nvSpPr>
-          <p:cNvPr id="5" name="Footer Placeholder 4"/>
+          <p:cNvPr id="1968534494" name="Footer Placeholder 4"/>
           <p:cNvSpPr>
             <a:spLocks noGrp="1"/>
           </p:cNvSpPr>
@@ -4865,7 +5031,7 @@
       </p:sp>
       <p:sp>
         <p:nvSpPr>
-          <p:cNvPr id="6" name="Slide Number Placeholder 5"/>
+          <p:cNvPr id="1757507941" name="Slide Number Placeholder 5"/>
           <p:cNvSpPr>
             <a:spLocks noGrp="1"/>
           </p:cNvSpPr>
@@ -4909,7 +5075,7 @@
       </p:sp>
       <p:sp>
         <p:nvSpPr>
-          <p:cNvPr id="2" name="Title 1"/>
+          <p:cNvPr id="898967519" name="Title 1"/>
           <p:cNvSpPr>
             <a:spLocks noGrp="1"/>
           </p:cNvSpPr>
@@ -5231,7 +5397,7 @@
       </p:grpSpPr>
       <p:sp>
         <p:nvSpPr>
-          <p:cNvPr id="2" name="Título 1"/>
+          <p:cNvPr id="164232913" name="Título 1"/>
           <p:cNvSpPr>
             <a:spLocks noGrp="1"/>
           </p:cNvSpPr>
@@ -5257,7 +5423,7 @@
       </p:sp>
       <p:sp>
         <p:nvSpPr>
-          <p:cNvPr id="3" name="Subtítulo 2"/>
+          <p:cNvPr id="1331282179" name="Subtítulo 2"/>
           <p:cNvSpPr>
             <a:spLocks noGrp="1"/>
           </p:cNvSpPr>
@@ -5316,7 +5482,7 @@
       </p:grpSpPr>
       <p:sp>
         <p:nvSpPr>
-          <p:cNvPr id="2099151985" name="Title 1"/>
+          <p:cNvPr id="90375130" name="Title 1"/>
           <p:cNvSpPr>
             <a:spLocks noGrp="1"/>
           </p:cNvSpPr>
@@ -5342,7 +5508,7 @@
       </p:sp>
       <p:sp>
         <p:nvSpPr>
-          <p:cNvPr id="1140361806" name="Content Placeholder 2"/>
+          <p:cNvPr id="1123843705" name="Content Placeholder 2"/>
           <p:cNvSpPr>
             <a:spLocks noGrp="1"/>
           </p:cNvSpPr>
@@ -5401,7 +5567,7 @@
       </p:sp>
       <p:sp>
         <p:nvSpPr>
-          <p:cNvPr id="519102446" name="Content Placeholder 3"/>
+          <p:cNvPr id="1313444388" name="Content Placeholder 3"/>
           <p:cNvSpPr>
             <a:spLocks noGrp="1"/>
           </p:cNvSpPr>
@@ -5456,7 +5622,7 @@
       </p:sp>
       <p:pic>
         <p:nvPicPr>
-          <p:cNvPr id="54778223" name=""/>
+          <p:cNvPr id="962813604" name=""/>
           <p:cNvPicPr>
             <a:picLocks noChangeAspect="1"/>
           </p:cNvPicPr>
@@ -5511,7 +5677,7 @@
       </p:grpSpPr>
       <p:sp>
         <p:nvSpPr>
-          <p:cNvPr id="872149168" name="Title 1"/>
+          <p:cNvPr id="922609511" name="Title 1"/>
           <p:cNvSpPr>
             <a:spLocks noGrp="1"/>
           </p:cNvSpPr>
@@ -5537,7 +5703,7 @@
       </p:sp>
       <p:sp>
         <p:nvSpPr>
-          <p:cNvPr id="1470769522" name="Content Placeholder 2"/>
+          <p:cNvPr id="1231671518" name="Content Placeholder 2"/>
           <p:cNvSpPr>
             <a:spLocks noGrp="1"/>
           </p:cNvSpPr>
@@ -5596,7 +5762,7 @@
       </p:sp>
       <p:sp>
         <p:nvSpPr>
-          <p:cNvPr id="1790035315" name="Content Placeholder 3"/>
+          <p:cNvPr id="554670750" name="Content Placeholder 3"/>
           <p:cNvSpPr>
             <a:spLocks noGrp="1"/>
           </p:cNvSpPr>
@@ -5651,7 +5817,7 @@
       </p:sp>
       <p:pic>
         <p:nvPicPr>
-          <p:cNvPr id="1617105948" name=""/>
+          <p:cNvPr id="441259708" name=""/>
           <p:cNvPicPr>
             <a:picLocks noChangeAspect="1"/>
           </p:cNvPicPr>
@@ -5706,7 +5872,7 @@
       </p:grpSpPr>
       <p:sp>
         <p:nvSpPr>
-          <p:cNvPr id="749247319" name="Title 1"/>
+          <p:cNvPr id="1144842339" name="Title 1"/>
           <p:cNvSpPr>
             <a:spLocks noGrp="1"/>
           </p:cNvSpPr>
@@ -5732,7 +5898,7 @@
       </p:sp>
       <p:sp>
         <p:nvSpPr>
-          <p:cNvPr id="523803378" name="Content Placeholder 2"/>
+          <p:cNvPr id="2116341518" name="Content Placeholder 2"/>
           <p:cNvSpPr>
             <a:spLocks noGrp="1"/>
           </p:cNvSpPr>
@@ -5791,7 +5957,7 @@
       </p:sp>
       <p:sp>
         <p:nvSpPr>
-          <p:cNvPr id="759440813" name="Content Placeholder 3"/>
+          <p:cNvPr id="1133930015" name="Content Placeholder 3"/>
           <p:cNvSpPr>
             <a:spLocks noGrp="1"/>
           </p:cNvSpPr>
@@ -5846,7 +6012,7 @@
       </p:sp>
       <p:pic>
         <p:nvPicPr>
-          <p:cNvPr id="2145998188" name=""/>
+          <p:cNvPr id="460471919" name=""/>
           <p:cNvPicPr>
             <a:picLocks noChangeAspect="1"/>
           </p:cNvPicPr>
@@ -5860,6 +6026,396 @@
           <a:xfrm flipH="0" flipV="0">
             <a:off x="7247041" y="1184519"/>
             <a:ext cx="3285914" cy="5544134"/>
+          </a:xfrm>
+          <a:prstGeom prst="rect">
+            <a:avLst/>
+          </a:prstGeom>
+        </p:spPr>
+      </p:pic>
+    </p:spTree>
+  </p:cSld>
+  <p:clrMapOvr>
+    <a:masterClrMapping/>
+  </p:clrMapOvr>
+  <mc:AlternateContent xmlns:mc="http://schemas.openxmlformats.org/markup-compatibility/2006">
+    <mc:Choice xmlns:p159="http://schemas.microsoft.com/office/powerpoint/2015/09/main" xmlns:p14="http://schemas.microsoft.com/office/powerpoint/2010/main" Requires="p159">
+      <p:transition p14:dur="2000" advClick="1"/>
+    </mc:Choice>
+    <mc:Fallback>
+      <p:transition advClick="1"/>
+    </mc:Fallback>
+  </mc:AlternateContent>
+</p:sld>
+</file>
+
+<file path=ppt/slides/slide13.xml><?xml version="1.0" encoding="utf-8"?>
+<p:sld xmlns:a="http://schemas.openxmlformats.org/drawingml/2006/main" xmlns:r="http://schemas.openxmlformats.org/officeDocument/2006/relationships" xmlns:p="http://schemas.openxmlformats.org/presentationml/2006/main" xmlns:m="http://schemas.openxmlformats.org/officeDocument/2006/math" xmlns:w="http://schemas.openxmlformats.org/wordprocessingml/2006/main" xmlns:mc="http://schemas.openxmlformats.org/markup-compatibility/2006" showMasterPhAnim="0" showMasterSp="1" show="1">
+  <p:cSld name="">
+    <p:spTree>
+      <p:nvGrpSpPr>
+        <p:cNvPr id="1" name=""/>
+        <p:cNvGrpSpPr/>
+        <p:nvPr/>
+      </p:nvGrpSpPr>
+      <p:grpSpPr bwMode="auto">
+        <a:xfrm>
+          <a:off x="0" y="0"/>
+          <a:ext cx="0" cy="0"/>
+          <a:chOff x="0" y="0"/>
+          <a:chExt cx="0" cy="0"/>
+        </a:xfrm>
+      </p:grpSpPr>
+      <p:sp>
+        <p:nvSpPr>
+          <p:cNvPr id="1518931801" name="Title 1"/>
+          <p:cNvSpPr>
+            <a:spLocks noGrp="1"/>
+          </p:cNvSpPr>
+          <p:nvPr>
+            <p:ph type="title"/>
+          </p:nvPr>
+        </p:nvSpPr>
+        <p:spPr bwMode="auto"/>
+        <p:txBody>
+          <a:bodyPr/>
+          <a:lstStyle/>
+          <a:p>
+            <a:pPr>
+              <a:defRPr/>
+            </a:pPr>
+            <a:r>
+              <a:rPr/>
+              <a:t>Vista ‘login’</a:t>
+            </a:r>
+            <a:endParaRPr/>
+          </a:p>
+        </p:txBody>
+      </p:sp>
+      <p:sp>
+        <p:nvSpPr>
+          <p:cNvPr id="1181468954" name="Content Placeholder 2"/>
+          <p:cNvSpPr>
+            <a:spLocks noGrp="1"/>
+          </p:cNvSpPr>
+          <p:nvPr>
+            <p:ph sz="half" idx="1"/>
+          </p:nvPr>
+        </p:nvSpPr>
+        <p:spPr bwMode="auto">
+          <a:xfrm>
+            <a:off x="609598" y="1600200"/>
+            <a:ext cx="5384799" cy="4525961"/>
+          </a:xfrm>
+        </p:spPr>
+        <p:txBody>
+          <a:bodyPr/>
+          <a:lstStyle>
+            <a:lvl1pPr>
+              <a:defRPr sz="2800"/>
+            </a:lvl1pPr>
+            <a:lvl2pPr>
+              <a:defRPr sz="2400"/>
+            </a:lvl2pPr>
+            <a:lvl3pPr>
+              <a:defRPr sz="2000"/>
+            </a:lvl3pPr>
+            <a:lvl4pPr>
+              <a:defRPr sz="1800"/>
+            </a:lvl4pPr>
+            <a:lvl5pPr>
+              <a:defRPr sz="1800"/>
+            </a:lvl5pPr>
+            <a:lvl6pPr>
+              <a:defRPr sz="1800"/>
+            </a:lvl6pPr>
+            <a:lvl7pPr>
+              <a:defRPr sz="1800"/>
+            </a:lvl7pPr>
+            <a:lvl8pPr>
+              <a:defRPr sz="1800"/>
+            </a:lvl8pPr>
+            <a:lvl9pPr>
+              <a:defRPr sz="1800"/>
+            </a:lvl9pPr>
+          </a:lstStyle>
+          <a:p>
+            <a:pPr>
+              <a:defRPr/>
+            </a:pPr>
+            <a:r>
+              <a:rPr/>
+              <a:t>(Recién creada)</a:t>
+            </a:r>
+            <a:endParaRPr/>
+          </a:p>
+        </p:txBody>
+      </p:sp>
+      <p:sp>
+        <p:nvSpPr>
+          <p:cNvPr id="1522084154" name="Content Placeholder 3"/>
+          <p:cNvSpPr>
+            <a:spLocks noGrp="1"/>
+          </p:cNvSpPr>
+          <p:nvPr>
+            <p:ph sz="half" idx="2"/>
+          </p:nvPr>
+        </p:nvSpPr>
+        <p:spPr bwMode="auto">
+          <a:xfrm>
+            <a:off x="6197598" y="1600200"/>
+            <a:ext cx="5384799" cy="4525961"/>
+          </a:xfrm>
+        </p:spPr>
+        <p:txBody>
+          <a:bodyPr/>
+          <a:lstStyle>
+            <a:lvl1pPr>
+              <a:defRPr sz="2800"/>
+            </a:lvl1pPr>
+            <a:lvl2pPr>
+              <a:defRPr sz="2400"/>
+            </a:lvl2pPr>
+            <a:lvl3pPr>
+              <a:defRPr sz="2000"/>
+            </a:lvl3pPr>
+            <a:lvl4pPr>
+              <a:defRPr sz="1800"/>
+            </a:lvl4pPr>
+            <a:lvl5pPr>
+              <a:defRPr sz="1800"/>
+            </a:lvl5pPr>
+            <a:lvl6pPr>
+              <a:defRPr sz="1800"/>
+            </a:lvl6pPr>
+            <a:lvl7pPr>
+              <a:defRPr sz="1800"/>
+            </a:lvl7pPr>
+            <a:lvl8pPr>
+              <a:defRPr sz="1800"/>
+            </a:lvl8pPr>
+            <a:lvl9pPr>
+              <a:defRPr sz="1800"/>
+            </a:lvl9pPr>
+          </a:lstStyle>
+          <a:p>
+            <a:pPr>
+              <a:defRPr/>
+            </a:pPr>
+            <a:endParaRPr/>
+          </a:p>
+        </p:txBody>
+      </p:sp>
+      <p:pic>
+        <p:nvPicPr>
+          <p:cNvPr id="1258382880" name=""/>
+          <p:cNvPicPr>
+            <a:picLocks noChangeAspect="1"/>
+          </p:cNvPicPr>
+          <p:nvPr/>
+        </p:nvPicPr>
+        <p:blipFill>
+          <a:blip r:embed="rId3"/>
+          <a:stretch/>
+        </p:blipFill>
+        <p:spPr bwMode="auto">
+          <a:xfrm>
+            <a:off x="6325576" y="1600200"/>
+            <a:ext cx="4362449" cy="2533649"/>
+          </a:xfrm>
+          <a:prstGeom prst="rect">
+            <a:avLst/>
+          </a:prstGeom>
+        </p:spPr>
+      </p:pic>
+    </p:spTree>
+  </p:cSld>
+  <p:clrMapOvr>
+    <a:masterClrMapping/>
+  </p:clrMapOvr>
+  <mc:AlternateContent xmlns:mc="http://schemas.openxmlformats.org/markup-compatibility/2006">
+    <mc:Choice xmlns:p159="http://schemas.microsoft.com/office/powerpoint/2015/09/main" xmlns:p14="http://schemas.microsoft.com/office/powerpoint/2010/main" Requires="p159">
+      <p:transition p14:dur="2000" advClick="1"/>
+    </mc:Choice>
+    <mc:Fallback>
+      <p:transition advClick="1"/>
+    </mc:Fallback>
+  </mc:AlternateContent>
+</p:sld>
+</file>
+
+<file path=ppt/slides/slide14.xml><?xml version="1.0" encoding="utf-8"?>
+<p:sld xmlns:a="http://schemas.openxmlformats.org/drawingml/2006/main" xmlns:r="http://schemas.openxmlformats.org/officeDocument/2006/relationships" xmlns:p="http://schemas.openxmlformats.org/presentationml/2006/main" xmlns:m="http://schemas.openxmlformats.org/officeDocument/2006/math" xmlns:w="http://schemas.openxmlformats.org/wordprocessingml/2006/main" xmlns:mc="http://schemas.openxmlformats.org/markup-compatibility/2006" showMasterPhAnim="0" showMasterSp="1" show="1">
+  <p:cSld name="">
+    <p:spTree>
+      <p:nvGrpSpPr>
+        <p:cNvPr id="1" name=""/>
+        <p:cNvGrpSpPr/>
+        <p:nvPr/>
+      </p:nvGrpSpPr>
+      <p:grpSpPr bwMode="auto">
+        <a:xfrm>
+          <a:off x="0" y="0"/>
+          <a:ext cx="0" cy="0"/>
+          <a:chOff x="0" y="0"/>
+          <a:chExt cx="0" cy="0"/>
+        </a:xfrm>
+      </p:grpSpPr>
+      <p:sp>
+        <p:nvSpPr>
+          <p:cNvPr id="1595148631" name="Title 1"/>
+          <p:cNvSpPr>
+            <a:spLocks noGrp="1"/>
+          </p:cNvSpPr>
+          <p:nvPr>
+            <p:ph type="title"/>
+          </p:nvPr>
+        </p:nvSpPr>
+        <p:spPr bwMode="auto"/>
+        <p:txBody>
+          <a:bodyPr/>
+          <a:lstStyle/>
+          <a:p>
+            <a:pPr>
+              <a:defRPr/>
+            </a:pPr>
+            <a:r>
+              <a:rPr/>
+              <a:t>Vista ‘singup’</a:t>
+            </a:r>
+            <a:endParaRPr/>
+          </a:p>
+        </p:txBody>
+      </p:sp>
+      <p:sp>
+        <p:nvSpPr>
+          <p:cNvPr id="1144154197" name="Content Placeholder 2"/>
+          <p:cNvSpPr>
+            <a:spLocks noGrp="1"/>
+          </p:cNvSpPr>
+          <p:nvPr>
+            <p:ph sz="half" idx="1"/>
+          </p:nvPr>
+        </p:nvSpPr>
+        <p:spPr bwMode="auto">
+          <a:xfrm>
+            <a:off x="609598" y="1600200"/>
+            <a:ext cx="5384799" cy="4525961"/>
+          </a:xfrm>
+        </p:spPr>
+        <p:txBody>
+          <a:bodyPr/>
+          <a:lstStyle>
+            <a:lvl1pPr>
+              <a:defRPr sz="2800"/>
+            </a:lvl1pPr>
+            <a:lvl2pPr>
+              <a:defRPr sz="2400"/>
+            </a:lvl2pPr>
+            <a:lvl3pPr>
+              <a:defRPr sz="2000"/>
+            </a:lvl3pPr>
+            <a:lvl4pPr>
+              <a:defRPr sz="1800"/>
+            </a:lvl4pPr>
+            <a:lvl5pPr>
+              <a:defRPr sz="1800"/>
+            </a:lvl5pPr>
+            <a:lvl6pPr>
+              <a:defRPr sz="1800"/>
+            </a:lvl6pPr>
+            <a:lvl7pPr>
+              <a:defRPr sz="1800"/>
+            </a:lvl7pPr>
+            <a:lvl8pPr>
+              <a:defRPr sz="1800"/>
+            </a:lvl8pPr>
+            <a:lvl9pPr>
+              <a:defRPr sz="1800"/>
+            </a:lvl9pPr>
+          </a:lstStyle>
+          <a:p>
+            <a:pPr>
+              <a:defRPr/>
+            </a:pPr>
+            <a:r>
+              <a:rPr/>
+              <a:t>(Recién creada)</a:t>
+            </a:r>
+            <a:endParaRPr/>
+          </a:p>
+        </p:txBody>
+      </p:sp>
+      <p:sp>
+        <p:nvSpPr>
+          <p:cNvPr id="1586187159" name="Content Placeholder 3"/>
+          <p:cNvSpPr>
+            <a:spLocks noGrp="1"/>
+          </p:cNvSpPr>
+          <p:nvPr>
+            <p:ph sz="half" idx="2"/>
+          </p:nvPr>
+        </p:nvSpPr>
+        <p:spPr bwMode="auto">
+          <a:xfrm>
+            <a:off x="6197598" y="1600200"/>
+            <a:ext cx="5384799" cy="4525961"/>
+          </a:xfrm>
+        </p:spPr>
+        <p:txBody>
+          <a:bodyPr/>
+          <a:lstStyle>
+            <a:lvl1pPr>
+              <a:defRPr sz="2800"/>
+            </a:lvl1pPr>
+            <a:lvl2pPr>
+              <a:defRPr sz="2400"/>
+            </a:lvl2pPr>
+            <a:lvl3pPr>
+              <a:defRPr sz="2000"/>
+            </a:lvl3pPr>
+            <a:lvl4pPr>
+              <a:defRPr sz="1800"/>
+            </a:lvl4pPr>
+            <a:lvl5pPr>
+              <a:defRPr sz="1800"/>
+            </a:lvl5pPr>
+            <a:lvl6pPr>
+              <a:defRPr sz="1800"/>
+            </a:lvl6pPr>
+            <a:lvl7pPr>
+              <a:defRPr sz="1800"/>
+            </a:lvl7pPr>
+            <a:lvl8pPr>
+              <a:defRPr sz="1800"/>
+            </a:lvl8pPr>
+            <a:lvl9pPr>
+              <a:defRPr sz="1800"/>
+            </a:lvl9pPr>
+          </a:lstStyle>
+          <a:p>
+            <a:pPr>
+              <a:defRPr/>
+            </a:pPr>
+            <a:endParaRPr/>
+          </a:p>
+        </p:txBody>
+      </p:sp>
+      <p:pic>
+        <p:nvPicPr>
+          <p:cNvPr id="1762070989" name=""/>
+          <p:cNvPicPr>
+            <a:picLocks noChangeAspect="1"/>
+          </p:cNvPicPr>
+          <p:nvPr/>
+        </p:nvPicPr>
+        <p:blipFill>
+          <a:blip r:embed="rId3"/>
+          <a:stretch/>
+        </p:blipFill>
+        <p:spPr bwMode="auto">
+          <a:xfrm>
+            <a:off x="5861538" y="1600200"/>
+            <a:ext cx="5248274" cy="2838449"/>
           </a:xfrm>
           <a:prstGeom prst="rect">
             <a:avLst/>
@@ -5901,7 +6457,7 @@
       </p:grpSpPr>
       <p:sp>
         <p:nvSpPr>
-          <p:cNvPr id="217774373" name="Title 1"/>
+          <p:cNvPr id="992556246" name="Title 1"/>
           <p:cNvSpPr>
             <a:spLocks noGrp="1"/>
           </p:cNvSpPr>
@@ -5927,7 +6483,7 @@
       </p:sp>
       <p:sp>
         <p:nvSpPr>
-          <p:cNvPr id="1869916815" name="Content Placeholder 2"/>
+          <p:cNvPr id="2114708315" name="Content Placeholder 2"/>
           <p:cNvSpPr>
             <a:spLocks noGrp="1"/>
           </p:cNvSpPr>
@@ -5949,7 +6505,7 @@
       </p:sp>
       <p:pic>
         <p:nvPicPr>
-          <p:cNvPr id="452133539" name=""/>
+          <p:cNvPr id="1836521803" name=""/>
           <p:cNvPicPr>
             <a:picLocks noChangeAspect="1"/>
           </p:cNvPicPr>
@@ -6004,7 +6560,7 @@
       </p:grpSpPr>
       <p:sp>
         <p:nvSpPr>
-          <p:cNvPr id="462896654" name="Title 1"/>
+          <p:cNvPr id="351263092" name="Title 1"/>
           <p:cNvSpPr>
             <a:spLocks noGrp="1"/>
           </p:cNvSpPr>
@@ -6032,7 +6588,7 @@
       </p:sp>
       <p:sp>
         <p:nvSpPr>
-          <p:cNvPr id="829190094" name="Content Placeholder 2"/>
+          <p:cNvPr id="850464595" name="Content Placeholder 2"/>
           <p:cNvSpPr>
             <a:spLocks noGrp="1"/>
           </p:cNvSpPr>
@@ -6054,7 +6610,7 @@
       </p:sp>
       <p:pic>
         <p:nvPicPr>
-          <p:cNvPr id="644137653" name=""/>
+          <p:cNvPr id="42807600" name=""/>
           <p:cNvPicPr>
             <a:picLocks noChangeAspect="1"/>
           </p:cNvPicPr>
@@ -6109,7 +6665,7 @@
       </p:grpSpPr>
       <p:sp>
         <p:nvSpPr>
-          <p:cNvPr id="1715010220" name="Title 1"/>
+          <p:cNvPr id="689888750" name="Title 1"/>
           <p:cNvSpPr>
             <a:spLocks noGrp="1"/>
           </p:cNvSpPr>
@@ -6135,7 +6691,7 @@
       </p:sp>
       <p:sp>
         <p:nvSpPr>
-          <p:cNvPr id="1046631938" name="Content Placeholder 2"/>
+          <p:cNvPr id="1788025865" name="Content Placeholder 2"/>
           <p:cNvSpPr>
             <a:spLocks noGrp="1"/>
           </p:cNvSpPr>
@@ -6161,7 +6717,7 @@
       </p:sp>
       <p:pic>
         <p:nvPicPr>
-          <p:cNvPr id="1033648309" name=""/>
+          <p:cNvPr id="808559070" name=""/>
           <p:cNvPicPr>
             <a:picLocks noChangeAspect="1"/>
           </p:cNvPicPr>
@@ -6216,7 +6772,7 @@
       </p:grpSpPr>
       <p:sp>
         <p:nvSpPr>
-          <p:cNvPr id="709790050" name="Title 1"/>
+          <p:cNvPr id="1096430726" name="Title 1"/>
           <p:cNvSpPr>
             <a:spLocks noGrp="1"/>
           </p:cNvSpPr>
@@ -6242,7 +6798,7 @@
       </p:sp>
       <p:sp>
         <p:nvSpPr>
-          <p:cNvPr id="1395680714" name="Content Placeholder 2"/>
+          <p:cNvPr id="9799843" name="Content Placeholder 2"/>
           <p:cNvSpPr>
             <a:spLocks noGrp="1"/>
           </p:cNvSpPr>
@@ -6268,7 +6824,7 @@
       </p:sp>
       <p:pic>
         <p:nvPicPr>
-          <p:cNvPr id="112511495" name=""/>
+          <p:cNvPr id="1060217843" name=""/>
           <p:cNvPicPr>
             <a:picLocks noChangeAspect="1"/>
           </p:cNvPicPr>
@@ -6323,7 +6879,7 @@
       </p:grpSpPr>
       <p:sp>
         <p:nvSpPr>
-          <p:cNvPr id="1092298972" name="Title 1"/>
+          <p:cNvPr id="796161076" name="Title 1"/>
           <p:cNvSpPr>
             <a:spLocks noGrp="1"/>
           </p:cNvSpPr>
@@ -6349,7 +6905,7 @@
       </p:sp>
       <p:sp>
         <p:nvSpPr>
-          <p:cNvPr id="1481975993" name="Content Placeholder 2"/>
+          <p:cNvPr id="1303426117" name="Content Placeholder 2"/>
           <p:cNvSpPr>
             <a:spLocks noGrp="1"/>
           </p:cNvSpPr>
@@ -6375,7 +6931,7 @@
       </p:sp>
       <p:sp>
         <p:nvSpPr>
-          <p:cNvPr id="16700067" name="Content Placeholder 3"/>
+          <p:cNvPr id="2129907863" name="Content Placeholder 3"/>
           <p:cNvSpPr>
             <a:spLocks noGrp="1"/>
           </p:cNvSpPr>
@@ -6430,7 +6986,7 @@
       </p:sp>
       <p:pic>
         <p:nvPicPr>
-          <p:cNvPr id="577371610" name=""/>
+          <p:cNvPr id="1020509320" name=""/>
           <p:cNvPicPr>
             <a:picLocks noChangeAspect="1"/>
           </p:cNvPicPr>
@@ -6485,7 +7041,7 @@
       </p:grpSpPr>
       <p:sp>
         <p:nvSpPr>
-          <p:cNvPr id="2141470993" name="Title 1"/>
+          <p:cNvPr id="291402805" name="Title 1"/>
           <p:cNvSpPr>
             <a:spLocks noGrp="1"/>
           </p:cNvSpPr>
@@ -6511,7 +7067,7 @@
       </p:sp>
       <p:sp>
         <p:nvSpPr>
-          <p:cNvPr id="453144650" name="Content Placeholder 2"/>
+          <p:cNvPr id="1331447507" name="Content Placeholder 2"/>
           <p:cNvSpPr>
             <a:spLocks noGrp="1"/>
           </p:cNvSpPr>
@@ -6570,7 +7126,7 @@
       </p:sp>
       <p:sp>
         <p:nvSpPr>
-          <p:cNvPr id="527643100" name="Content Placeholder 3"/>
+          <p:cNvPr id="1006224395" name="Content Placeholder 3"/>
           <p:cNvSpPr>
             <a:spLocks noGrp="1"/>
           </p:cNvSpPr>
@@ -6625,7 +7181,7 @@
       </p:sp>
       <p:pic>
         <p:nvPicPr>
-          <p:cNvPr id="1003471005" name=""/>
+          <p:cNvPr id="664984300" name=""/>
           <p:cNvPicPr>
             <a:picLocks noChangeAspect="1"/>
           </p:cNvPicPr>
@@ -6680,7 +7236,7 @@
       </p:grpSpPr>
       <p:sp>
         <p:nvSpPr>
-          <p:cNvPr id="699968128" name="Title 1"/>
+          <p:cNvPr id="1454490656" name="Title 1"/>
           <p:cNvSpPr>
             <a:spLocks noGrp="1"/>
           </p:cNvSpPr>
@@ -6706,7 +7262,7 @@
       </p:sp>
       <p:sp>
         <p:nvSpPr>
-          <p:cNvPr id="413627382" name="Content Placeholder 2"/>
+          <p:cNvPr id="675404079" name="Content Placeholder 2"/>
           <p:cNvSpPr>
             <a:spLocks noGrp="1"/>
           </p:cNvSpPr>
@@ -6765,7 +7321,7 @@
       </p:sp>
       <p:sp>
         <p:nvSpPr>
-          <p:cNvPr id="225480772" name="Content Placeholder 3"/>
+          <p:cNvPr id="684179039" name="Content Placeholder 3"/>
           <p:cNvSpPr>
             <a:spLocks noGrp="1"/>
           </p:cNvSpPr>
@@ -6820,7 +7376,7 @@
       </p:sp>
       <p:pic>
         <p:nvPicPr>
-          <p:cNvPr id="2130047112" name=""/>
+          <p:cNvPr id="1078278140" name=""/>
           <p:cNvPicPr>
             <a:picLocks noChangeAspect="1"/>
           </p:cNvPicPr>
@@ -6875,7 +7431,7 @@
       </p:grpSpPr>
       <p:sp>
         <p:nvSpPr>
-          <p:cNvPr id="1503828629" name="Title 1"/>
+          <p:cNvPr id="1153953949" name="Title 1"/>
           <p:cNvSpPr>
             <a:spLocks noGrp="1"/>
           </p:cNvSpPr>
@@ -6901,7 +7457,7 @@
       </p:sp>
       <p:sp>
         <p:nvSpPr>
-          <p:cNvPr id="1867282575" name="Content Placeholder 2"/>
+          <p:cNvPr id="1745985110" name="Content Placeholder 2"/>
           <p:cNvSpPr>
             <a:spLocks noGrp="1"/>
           </p:cNvSpPr>
@@ -6960,7 +7516,7 @@
       </p:sp>
       <p:sp>
         <p:nvSpPr>
-          <p:cNvPr id="418822375" name="Content Placeholder 3"/>
+          <p:cNvPr id="301057090" name="Content Placeholder 3"/>
           <p:cNvSpPr>
             <a:spLocks noGrp="1"/>
           </p:cNvSpPr>
@@ -7015,7 +7571,7 @@
       </p:sp>
       <p:pic>
         <p:nvPicPr>
-          <p:cNvPr id="500850434" name=""/>
+          <p:cNvPr id="2108057191" name=""/>
           <p:cNvPicPr>
             <a:picLocks noChangeAspect="1"/>
           </p:cNvPicPr>

</xml_diff>